<commit_message>
modify: length pdf and presentation fixed
</commit_message>
<xml_diff>
--- a/BIOSIGNALS_2026.pptx
+++ b/BIOSIGNALS_2026.pptx
@@ -129,6 +129,11 @@
       </a:defRPr>
     </a:lvl9pPr>
   </p:defaultTextStyle>
+  <p:extLst>
+    <p:ext uri="{EFAFB233-063F-42B5-8137-9DF3F51BA10A}">
+      <p15:sldGuideLst xmlns:p15="http://schemas.microsoft.com/office/powerpoint/2012/main"/>
+    </p:ext>
+  </p:extLst>
 </p:presentation>
 </file>
 
@@ -214,7 +219,7 @@
           <a:p>
             <a:fld id="{C6590EC9-D202-4E5F-BA58-242D71CEA25B}" type="datetimeFigureOut">
               <a:rPr lang="es-MX" smtClean="0"/>
-              <a:t>01/01/2026</a:t>
+              <a:t>10/01/2026</a:t>
             </a:fld>
             <a:endParaRPr lang="es-MX"/>
           </a:p>
@@ -631,7 +636,7 @@
           <a:p>
             <a:fld id="{C9E02A8C-6334-4A3A-93B6-99B3CB8CEEBC}" type="datetime1">
               <a:rPr lang="es-MX" smtClean="0"/>
-              <a:t>01/01/2026</a:t>
+              <a:t>10/01/2026</a:t>
             </a:fld>
             <a:endParaRPr lang="es-MX"/>
           </a:p>
@@ -835,7 +840,7 @@
           <a:p>
             <a:fld id="{58BEAEDC-C1D5-4329-86EC-29413DEC4CB2}" type="datetime1">
               <a:rPr lang="es-MX" smtClean="0"/>
-              <a:t>01/01/2026</a:t>
+              <a:t>10/01/2026</a:t>
             </a:fld>
             <a:endParaRPr lang="es-MX"/>
           </a:p>
@@ -1049,7 +1054,7 @@
           <a:p>
             <a:fld id="{87D0E958-D445-4BB0-9F3B-1133FA499F55}" type="datetime1">
               <a:rPr lang="es-MX" smtClean="0"/>
-              <a:t>01/01/2026</a:t>
+              <a:t>10/01/2026</a:t>
             </a:fld>
             <a:endParaRPr lang="es-MX"/>
           </a:p>
@@ -1253,7 +1258,7 @@
           <a:p>
             <a:fld id="{90B279FB-120B-4E72-B465-0187E2B64CD1}" type="datetime1">
               <a:rPr lang="es-MX" smtClean="0"/>
-              <a:t>01/01/2026</a:t>
+              <a:t>10/01/2026</a:t>
             </a:fld>
             <a:endParaRPr lang="es-MX"/>
           </a:p>
@@ -1533,7 +1538,7 @@
           <a:p>
             <a:fld id="{60AA3348-109D-4E06-8A8E-2B216247CDE8}" type="datetime1">
               <a:rPr lang="es-MX" smtClean="0"/>
-              <a:t>01/01/2026</a:t>
+              <a:t>10/01/2026</a:t>
             </a:fld>
             <a:endParaRPr lang="es-MX"/>
           </a:p>
@@ -1805,7 +1810,7 @@
           <a:p>
             <a:fld id="{AF95FFFA-95C3-44ED-ABED-2FE51EBC3574}" type="datetime1">
               <a:rPr lang="es-MX" smtClean="0"/>
-              <a:t>01/01/2026</a:t>
+              <a:t>10/01/2026</a:t>
             </a:fld>
             <a:endParaRPr lang="es-MX"/>
           </a:p>
@@ -2224,7 +2229,7 @@
           <a:p>
             <a:fld id="{760EC6E2-99D3-4F4E-9F43-17C2E39CAA3F}" type="datetime1">
               <a:rPr lang="es-MX" smtClean="0"/>
-              <a:t>01/01/2026</a:t>
+              <a:t>10/01/2026</a:t>
             </a:fld>
             <a:endParaRPr lang="es-MX"/>
           </a:p>
@@ -2370,7 +2375,7 @@
           <a:p>
             <a:fld id="{5B826530-91EE-4E74-ABBF-504B1BDEAE7B}" type="datetime1">
               <a:rPr lang="es-MX" smtClean="0"/>
-              <a:t>01/01/2026</a:t>
+              <a:t>10/01/2026</a:t>
             </a:fld>
             <a:endParaRPr lang="es-MX"/>
           </a:p>
@@ -2487,7 +2492,7 @@
           <a:p>
             <a:fld id="{EBE73459-DF9C-4D22-916C-591B4188400E}" type="datetime1">
               <a:rPr lang="es-MX" smtClean="0"/>
-              <a:t>01/01/2026</a:t>
+              <a:t>10/01/2026</a:t>
             </a:fld>
             <a:endParaRPr lang="es-MX"/>
           </a:p>
@@ -2804,7 +2809,7 @@
           <a:p>
             <a:fld id="{663D12F6-C5A6-4DE0-B230-F6AD2BB4DEC4}" type="datetime1">
               <a:rPr lang="es-MX" smtClean="0"/>
-              <a:t>01/01/2026</a:t>
+              <a:t>10/01/2026</a:t>
             </a:fld>
             <a:endParaRPr lang="es-MX"/>
           </a:p>
@@ -3097,7 +3102,7 @@
           <a:p>
             <a:fld id="{01FCD688-BDA8-49B5-8C29-ED9A0DF0F53A}" type="datetime1">
               <a:rPr lang="es-MX" smtClean="0"/>
-              <a:t>01/01/2026</a:t>
+              <a:t>10/01/2026</a:t>
             </a:fld>
             <a:endParaRPr lang="es-MX"/>
           </a:p>
@@ -3344,7 +3349,7 @@
           <a:p>
             <a:fld id="{4A4091FD-6C1C-4A46-890B-2DA280EE7EDB}" type="datetime1">
               <a:rPr lang="es-MX" smtClean="0"/>
-              <a:t>01/01/2026</a:t>
+              <a:t>10/01/2026</a:t>
             </a:fld>
             <a:endParaRPr lang="es-MX"/>
           </a:p>
@@ -15961,13 +15966,13 @@
         </p:nvSpPr>
         <p:spPr>
           <a:xfrm>
-            <a:off x="838200" y="1531937"/>
-            <a:ext cx="10515600" cy="4768850"/>
+            <a:off x="336000" y="1431925"/>
+            <a:ext cx="11520000" cy="4768850"/>
           </a:xfrm>
         </p:spPr>
         <p:txBody>
           <a:bodyPr>
-            <a:normAutofit fontScale="32500" lnSpcReduction="20000"/>
+            <a:noAutofit/>
           </a:bodyPr>
           <a:lstStyle/>
           <a:p>
@@ -15976,21 +15981,21 @@
               <a:buAutoNum type="arabicPeriod"/>
             </a:pPr>
             <a:r>
-              <a:rPr lang="en-US" noProof="0" dirty="0">
+              <a:rPr lang="en-US" sz="950" noProof="0" dirty="0">
                 <a:latin typeface="Arial" panose="020B0604020202020204" pitchFamily="34" charset="0"/>
                 <a:cs typeface="Arial" panose="020B0604020202020204" pitchFamily="34" charset="0"/>
               </a:rPr>
               <a:t>Ahmed, A. (2022). A quick survey of </a:t>
             </a:r>
             <a:r>
-              <a:rPr lang="en-US" noProof="0" dirty="0" err="1">
+              <a:rPr lang="en-US" sz="950" noProof="0" dirty="0" err="1">
                 <a:latin typeface="Arial" panose="020B0604020202020204" pitchFamily="34" charset="0"/>
                 <a:cs typeface="Arial" panose="020B0604020202020204" pitchFamily="34" charset="0"/>
               </a:rPr>
               <a:t>eeg</a:t>
             </a:r>
             <a:r>
-              <a:rPr lang="en-US" noProof="0" dirty="0">
+              <a:rPr lang="en-US" sz="950" noProof="0" dirty="0">
                 <a:latin typeface="Arial" panose="020B0604020202020204" pitchFamily="34" charset="0"/>
                 <a:cs typeface="Arial" panose="020B0604020202020204" pitchFamily="34" charset="0"/>
               </a:rPr>
@@ -16003,21 +16008,21 @@
               <a:buAutoNum type="arabicPeriod"/>
             </a:pPr>
             <a:r>
-              <a:rPr lang="en-US" noProof="0" dirty="0">
+              <a:rPr lang="en-US" sz="950" noProof="0" dirty="0">
                 <a:latin typeface="Arial" panose="020B0604020202020204" pitchFamily="34" charset="0"/>
                 <a:cs typeface="Arial" panose="020B0604020202020204" pitchFamily="34" charset="0"/>
               </a:rPr>
               <a:t>Azhar, M., Shafique, T., and Amjad, A. (2024). A convolutional neural network for the removal of simultaneous ocular and myogenic artifacts from </a:t>
             </a:r>
             <a:r>
-              <a:rPr lang="en-US" noProof="0" dirty="0" err="1">
+              <a:rPr lang="en-US" sz="950" noProof="0" dirty="0" err="1">
                 <a:latin typeface="Arial" panose="020B0604020202020204" pitchFamily="34" charset="0"/>
                 <a:cs typeface="Arial" panose="020B0604020202020204" pitchFamily="34" charset="0"/>
               </a:rPr>
               <a:t>eeg</a:t>
             </a:r>
             <a:r>
-              <a:rPr lang="en-US" noProof="0" dirty="0">
+              <a:rPr lang="en-US" sz="950" noProof="0" dirty="0">
                 <a:latin typeface="Arial" panose="020B0604020202020204" pitchFamily="34" charset="0"/>
                 <a:cs typeface="Arial" panose="020B0604020202020204" pitchFamily="34" charset="0"/>
               </a:rPr>
@@ -16030,35 +16035,35 @@
               <a:buAutoNum type="arabicPeriod"/>
             </a:pPr>
             <a:r>
-              <a:rPr lang="en-US" noProof="0" dirty="0">
+              <a:rPr lang="en-US" sz="950" noProof="0" dirty="0">
                 <a:latin typeface="Arial" panose="020B0604020202020204" pitchFamily="34" charset="0"/>
                 <a:cs typeface="Arial" panose="020B0604020202020204" pitchFamily="34" charset="0"/>
               </a:rPr>
               <a:t>Bahador, N., Erikson, K., Laurila, J., </a:t>
             </a:r>
             <a:r>
-              <a:rPr lang="en-US" noProof="0" dirty="0" err="1">
+              <a:rPr lang="en-US" sz="950" noProof="0" dirty="0" err="1">
                 <a:latin typeface="Arial" panose="020B0604020202020204" pitchFamily="34" charset="0"/>
                 <a:cs typeface="Arial" panose="020B0604020202020204" pitchFamily="34" charset="0"/>
               </a:rPr>
               <a:t>Koskenkari,J</a:t>
             </a:r>
             <a:r>
-              <a:rPr lang="en-US" noProof="0" dirty="0">
+              <a:rPr lang="en-US" sz="950" noProof="0" dirty="0">
                 <a:latin typeface="Arial" panose="020B0604020202020204" pitchFamily="34" charset="0"/>
                 <a:cs typeface="Arial" panose="020B0604020202020204" pitchFamily="34" charset="0"/>
               </a:rPr>
               <a:t>., Ala-Kokko, T., and Kortelainen, J. (2020a).Automatic detection of artifacts in </a:t>
             </a:r>
             <a:r>
-              <a:rPr lang="en-US" noProof="0" dirty="0" err="1">
+              <a:rPr lang="en-US" sz="950" noProof="0" dirty="0" err="1">
                 <a:latin typeface="Arial" panose="020B0604020202020204" pitchFamily="34" charset="0"/>
                 <a:cs typeface="Arial" panose="020B0604020202020204" pitchFamily="34" charset="0"/>
               </a:rPr>
               <a:t>eeg</a:t>
             </a:r>
             <a:r>
-              <a:rPr lang="en-US" noProof="0" dirty="0">
+              <a:rPr lang="en-US" sz="950" noProof="0" dirty="0">
                 <a:latin typeface="Arial" panose="020B0604020202020204" pitchFamily="34" charset="0"/>
                 <a:cs typeface="Arial" panose="020B0604020202020204" pitchFamily="34" charset="0"/>
               </a:rPr>
@@ -16071,42 +16076,42 @@
               <a:buAutoNum type="arabicPeriod"/>
             </a:pPr>
             <a:r>
-              <a:rPr lang="en-US" noProof="0" dirty="0">
+              <a:rPr lang="en-US" sz="950" noProof="0" dirty="0">
                 <a:latin typeface="Arial" panose="020B0604020202020204" pitchFamily="34" charset="0"/>
                 <a:cs typeface="Arial" panose="020B0604020202020204" pitchFamily="34" charset="0"/>
               </a:rPr>
               <a:t>Bahador, N., Erikson, K., Laurila, J., </a:t>
             </a:r>
             <a:r>
-              <a:rPr lang="en-US" noProof="0" dirty="0" err="1">
+              <a:rPr lang="en-US" sz="950" noProof="0" dirty="0" err="1">
                 <a:latin typeface="Arial" panose="020B0604020202020204" pitchFamily="34" charset="0"/>
                 <a:cs typeface="Arial" panose="020B0604020202020204" pitchFamily="34" charset="0"/>
               </a:rPr>
               <a:t>Koskenkari,J</a:t>
             </a:r>
             <a:r>
-              <a:rPr lang="en-US" noProof="0" dirty="0">
+              <a:rPr lang="en-US" sz="950" noProof="0" dirty="0">
                 <a:latin typeface="Arial" panose="020B0604020202020204" pitchFamily="34" charset="0"/>
                 <a:cs typeface="Arial" panose="020B0604020202020204" pitchFamily="34" charset="0"/>
               </a:rPr>
               <a:t>., Ala-Kokko, T., and Kortelainen, J. (2020b).A correlation-driven mapping for deep learning application in detecting artifacts within the </a:t>
             </a:r>
             <a:r>
-              <a:rPr lang="en-US" noProof="0" dirty="0" err="1">
+              <a:rPr lang="en-US" sz="950" noProof="0" dirty="0" err="1">
                 <a:latin typeface="Arial" panose="020B0604020202020204" pitchFamily="34" charset="0"/>
                 <a:cs typeface="Arial" panose="020B0604020202020204" pitchFamily="34" charset="0"/>
               </a:rPr>
               <a:t>eeg</a:t>
             </a:r>
             <a:r>
-              <a:rPr lang="en-US" dirty="0">
+              <a:rPr lang="en-US" sz="950" dirty="0">
                 <a:latin typeface="Arial" panose="020B0604020202020204" pitchFamily="34" charset="0"/>
                 <a:cs typeface="Arial" panose="020B0604020202020204" pitchFamily="34" charset="0"/>
               </a:rPr>
               <a:t>. </a:t>
             </a:r>
             <a:r>
-              <a:rPr lang="en-US" noProof="0" dirty="0">
+              <a:rPr lang="en-US" sz="950" noProof="0" dirty="0">
                 <a:latin typeface="Arial" panose="020B0604020202020204" pitchFamily="34" charset="0"/>
                 <a:cs typeface="Arial" panose="020B0604020202020204" pitchFamily="34" charset="0"/>
               </a:rPr>
@@ -16119,21 +16124,21 @@
               <a:buAutoNum type="arabicPeriod"/>
             </a:pPr>
             <a:r>
-              <a:rPr lang="en-US" noProof="0" dirty="0">
+              <a:rPr lang="en-US" sz="950" noProof="0" dirty="0">
                 <a:latin typeface="Arial" panose="020B0604020202020204" pitchFamily="34" charset="0"/>
                 <a:cs typeface="Arial" panose="020B0604020202020204" pitchFamily="34" charset="0"/>
               </a:rPr>
               <a:t>Bao, C., Hao, Z., and Dou, W. (2022). Automatic removal of scalp </a:t>
             </a:r>
             <a:r>
-              <a:rPr lang="en-US" noProof="0" dirty="0" err="1">
+              <a:rPr lang="en-US" sz="950" noProof="0" dirty="0" err="1">
                 <a:latin typeface="Arial" panose="020B0604020202020204" pitchFamily="34" charset="0"/>
                 <a:cs typeface="Arial" panose="020B0604020202020204" pitchFamily="34" charset="0"/>
               </a:rPr>
               <a:t>eeg</a:t>
             </a:r>
             <a:r>
-              <a:rPr lang="en-US" noProof="0" dirty="0">
+              <a:rPr lang="en-US" sz="950" noProof="0" dirty="0">
                 <a:latin typeface="Arial" panose="020B0604020202020204" pitchFamily="34" charset="0"/>
                 <a:cs typeface="Arial" panose="020B0604020202020204" pitchFamily="34" charset="0"/>
               </a:rPr>
@@ -16146,77 +16151,77 @@
               <a:buAutoNum type="arabicPeriod"/>
             </a:pPr>
             <a:r>
-              <a:rPr lang="en-US" noProof="0" dirty="0">
+              <a:rPr lang="en-US" sz="950" noProof="0" dirty="0">
                 <a:latin typeface="Arial" panose="020B0604020202020204" pitchFamily="34" charset="0"/>
                 <a:cs typeface="Arial" panose="020B0604020202020204" pitchFamily="34" charset="0"/>
               </a:rPr>
               <a:t>Brophy, E., Redmond, P., Fleury, A., De Vos, M., </a:t>
             </a:r>
             <a:r>
-              <a:rPr lang="en-US" noProof="0" dirty="0" err="1">
+              <a:rPr lang="en-US" sz="950" noProof="0" dirty="0" err="1">
                 <a:latin typeface="Arial" panose="020B0604020202020204" pitchFamily="34" charset="0"/>
                 <a:cs typeface="Arial" panose="020B0604020202020204" pitchFamily="34" charset="0"/>
               </a:rPr>
               <a:t>Boylan,G</a:t>
             </a:r>
             <a:r>
-              <a:rPr lang="en-US" noProof="0" dirty="0">
+              <a:rPr lang="en-US" sz="950" noProof="0" dirty="0">
                 <a:latin typeface="Arial" panose="020B0604020202020204" pitchFamily="34" charset="0"/>
                 <a:cs typeface="Arial" panose="020B0604020202020204" pitchFamily="34" charset="0"/>
               </a:rPr>
               <a:t>., and Ward, T. (2022). Denoising </a:t>
             </a:r>
             <a:r>
-              <a:rPr lang="en-US" noProof="0" dirty="0" err="1">
+              <a:rPr lang="en-US" sz="950" noProof="0" dirty="0" err="1">
                 <a:latin typeface="Arial" panose="020B0604020202020204" pitchFamily="34" charset="0"/>
                 <a:cs typeface="Arial" panose="020B0604020202020204" pitchFamily="34" charset="0"/>
               </a:rPr>
               <a:t>eeg</a:t>
             </a:r>
             <a:r>
-              <a:rPr lang="en-US" noProof="0" dirty="0">
+              <a:rPr lang="en-US" sz="950" noProof="0" dirty="0">
                 <a:latin typeface="Arial" panose="020B0604020202020204" pitchFamily="34" charset="0"/>
                 <a:cs typeface="Arial" panose="020B0604020202020204" pitchFamily="34" charset="0"/>
               </a:rPr>
               <a:t> signals for real-world </a:t>
             </a:r>
             <a:r>
-              <a:rPr lang="en-US" noProof="0" dirty="0" err="1">
+              <a:rPr lang="en-US" sz="950" noProof="0" dirty="0" err="1">
                 <a:latin typeface="Arial" panose="020B0604020202020204" pitchFamily="34" charset="0"/>
                 <a:cs typeface="Arial" panose="020B0604020202020204" pitchFamily="34" charset="0"/>
               </a:rPr>
               <a:t>bci</a:t>
             </a:r>
             <a:r>
-              <a:rPr lang="en-US" noProof="0" dirty="0">
+              <a:rPr lang="en-US" sz="950" noProof="0" dirty="0">
                 <a:latin typeface="Arial" panose="020B0604020202020204" pitchFamily="34" charset="0"/>
                 <a:cs typeface="Arial" panose="020B0604020202020204" pitchFamily="34" charset="0"/>
               </a:rPr>
               <a:t> applications using </a:t>
             </a:r>
             <a:r>
-              <a:rPr lang="en-US" noProof="0" dirty="0" err="1">
+              <a:rPr lang="en-US" sz="950" noProof="0" dirty="0" err="1">
                 <a:latin typeface="Arial" panose="020B0604020202020204" pitchFamily="34" charset="0"/>
                 <a:cs typeface="Arial" panose="020B0604020202020204" pitchFamily="34" charset="0"/>
               </a:rPr>
               <a:t>gans</a:t>
             </a:r>
             <a:r>
-              <a:rPr lang="en-US" noProof="0" dirty="0">
+              <a:rPr lang="en-US" sz="950" noProof="0" dirty="0">
                 <a:latin typeface="Arial" panose="020B0604020202020204" pitchFamily="34" charset="0"/>
                 <a:cs typeface="Arial" panose="020B0604020202020204" pitchFamily="34" charset="0"/>
               </a:rPr>
               <a:t>. Frontiers in </a:t>
             </a:r>
             <a:r>
-              <a:rPr lang="en-US" noProof="0" dirty="0" err="1">
+              <a:rPr lang="en-US" sz="950" noProof="0" dirty="0" err="1">
                 <a:latin typeface="Arial" panose="020B0604020202020204" pitchFamily="34" charset="0"/>
                 <a:cs typeface="Arial" panose="020B0604020202020204" pitchFamily="34" charset="0"/>
               </a:rPr>
               <a:t>Neuroergonomics</a:t>
             </a:r>
             <a:r>
-              <a:rPr lang="en-US" noProof="0" dirty="0">
+              <a:rPr lang="en-US" sz="950" noProof="0" dirty="0">
                 <a:latin typeface="Arial" panose="020B0604020202020204" pitchFamily="34" charset="0"/>
                 <a:cs typeface="Arial" panose="020B0604020202020204" pitchFamily="34" charset="0"/>
               </a:rPr>
@@ -16229,49 +16234,49 @@
               <a:buAutoNum type="arabicPeriod"/>
             </a:pPr>
             <a:r>
-              <a:rPr lang="en-US" noProof="0" dirty="0">
+              <a:rPr lang="en-US" sz="950" noProof="0" dirty="0">
                 <a:latin typeface="Arial" panose="020B0604020202020204" pitchFamily="34" charset="0"/>
                 <a:cs typeface="Arial" panose="020B0604020202020204" pitchFamily="34" charset="0"/>
               </a:rPr>
               <a:t>Cai, Y., Meng, Z., and Huang, D. (2025). </a:t>
             </a:r>
             <a:r>
-              <a:rPr lang="en-US" noProof="0" dirty="0" err="1">
+              <a:rPr lang="en-US" sz="950" noProof="0" dirty="0" err="1">
                 <a:latin typeface="Arial" panose="020B0604020202020204" pitchFamily="34" charset="0"/>
                 <a:cs typeface="Arial" panose="020B0604020202020204" pitchFamily="34" charset="0"/>
               </a:rPr>
               <a:t>Dhct-gan:Improving</a:t>
             </a:r>
             <a:r>
-              <a:rPr lang="en-US" noProof="0" dirty="0">
+              <a:rPr lang="en-US" sz="950" noProof="0" dirty="0">
                 <a:latin typeface="Arial" panose="020B0604020202020204" pitchFamily="34" charset="0"/>
                 <a:cs typeface="Arial" panose="020B0604020202020204" pitchFamily="34" charset="0"/>
               </a:rPr>
               <a:t> </a:t>
             </a:r>
             <a:r>
-              <a:rPr lang="en-US" noProof="0" dirty="0" err="1">
+              <a:rPr lang="en-US" sz="950" noProof="0" dirty="0" err="1">
                 <a:latin typeface="Arial" panose="020B0604020202020204" pitchFamily="34" charset="0"/>
                 <a:cs typeface="Arial" panose="020B0604020202020204" pitchFamily="34" charset="0"/>
               </a:rPr>
               <a:t>eeg</a:t>
             </a:r>
             <a:r>
-              <a:rPr lang="en-US" noProof="0" dirty="0">
+              <a:rPr lang="en-US" sz="950" noProof="0" dirty="0">
                 <a:latin typeface="Arial" panose="020B0604020202020204" pitchFamily="34" charset="0"/>
                 <a:cs typeface="Arial" panose="020B0604020202020204" pitchFamily="34" charset="0"/>
               </a:rPr>
               <a:t> signal quality with a dual-branch hybrid </a:t>
             </a:r>
             <a:r>
-              <a:rPr lang="en-US" noProof="0" dirty="0" err="1">
+              <a:rPr lang="en-US" sz="950" noProof="0" dirty="0" err="1">
                 <a:latin typeface="Arial" panose="020B0604020202020204" pitchFamily="34" charset="0"/>
                 <a:cs typeface="Arial" panose="020B0604020202020204" pitchFamily="34" charset="0"/>
               </a:rPr>
               <a:t>cnn</a:t>
             </a:r>
             <a:r>
-              <a:rPr lang="en-US" noProof="0" dirty="0">
+              <a:rPr lang="en-US" sz="950" noProof="0" dirty="0">
                 <a:latin typeface="Arial" panose="020B0604020202020204" pitchFamily="34" charset="0"/>
                 <a:cs typeface="Arial" panose="020B0604020202020204" pitchFamily="34" charset="0"/>
               </a:rPr>
@@ -16284,7 +16289,7 @@
               <a:buAutoNum type="arabicPeriod"/>
             </a:pPr>
             <a:r>
-              <a:rPr lang="en-US" noProof="0" dirty="0">
+              <a:rPr lang="en-US" sz="950" noProof="0" dirty="0">
                 <a:latin typeface="Arial" panose="020B0604020202020204" pitchFamily="34" charset="0"/>
                 <a:cs typeface="Arial" panose="020B0604020202020204" pitchFamily="34" charset="0"/>
               </a:rPr>
@@ -16297,63 +16302,63 @@
               <a:buAutoNum type="arabicPeriod"/>
             </a:pPr>
             <a:r>
-              <a:rPr lang="en-US" noProof="0" dirty="0">
+              <a:rPr lang="en-US" sz="950" noProof="0" dirty="0">
                 <a:latin typeface="Arial" panose="020B0604020202020204" pitchFamily="34" charset="0"/>
                 <a:cs typeface="Arial" panose="020B0604020202020204" pitchFamily="34" charset="0"/>
               </a:rPr>
               <a:t>Chuang, C.-H., Chang, K.-Y., Huang, C.-S., and Jung, T.-P. (2022). Ic-u-net: A u-net-based denoising autoencoder using mixtures of independent components for automatic </a:t>
             </a:r>
             <a:r>
-              <a:rPr lang="en-US" noProof="0" dirty="0" err="1">
+              <a:rPr lang="en-US" sz="950" noProof="0" dirty="0" err="1">
                 <a:latin typeface="Arial" panose="020B0604020202020204" pitchFamily="34" charset="0"/>
                 <a:cs typeface="Arial" panose="020B0604020202020204" pitchFamily="34" charset="0"/>
               </a:rPr>
               <a:t>eeg</a:t>
             </a:r>
             <a:r>
-              <a:rPr lang="en-US" noProof="0" dirty="0">
+              <a:rPr lang="en-US" sz="950" noProof="0" dirty="0">
                 <a:latin typeface="Arial" panose="020B0604020202020204" pitchFamily="34" charset="0"/>
                 <a:cs typeface="Arial" panose="020B0604020202020204" pitchFamily="34" charset="0"/>
               </a:rPr>
               <a:t> artifact removal. </a:t>
             </a:r>
             <a:r>
-              <a:rPr lang="en-US" noProof="0" dirty="0" err="1">
+              <a:rPr lang="en-US" sz="950" noProof="0" dirty="0" err="1">
                 <a:latin typeface="Arial" panose="020B0604020202020204" pitchFamily="34" charset="0"/>
                 <a:cs typeface="Arial" panose="020B0604020202020204" pitchFamily="34" charset="0"/>
               </a:rPr>
               <a:t>NeuroImage</a:t>
             </a:r>
             <a:r>
-              <a:rPr lang="en-US" noProof="0" dirty="0">
+              <a:rPr lang="en-US" sz="950" noProof="0" dirty="0">
                 <a:latin typeface="Arial" panose="020B0604020202020204" pitchFamily="34" charset="0"/>
                 <a:cs typeface="Arial" panose="020B0604020202020204" pitchFamily="34" charset="0"/>
               </a:rPr>
               <a:t>, 263:119586. </a:t>
             </a:r>
             <a:r>
-              <a:rPr lang="en-US" noProof="0" dirty="0" err="1">
+              <a:rPr lang="en-US" sz="950" noProof="0" dirty="0" err="1">
                 <a:latin typeface="Arial" panose="020B0604020202020204" pitchFamily="34" charset="0"/>
                 <a:cs typeface="Arial" panose="020B0604020202020204" pitchFamily="34" charset="0"/>
               </a:rPr>
               <a:t>Epub</a:t>
             </a:r>
             <a:r>
-              <a:rPr lang="en-US" noProof="0" dirty="0">
+              <a:rPr lang="en-US" sz="950" noProof="0" dirty="0">
                 <a:latin typeface="Arial" panose="020B0604020202020204" pitchFamily="34" charset="0"/>
                 <a:cs typeface="Arial" panose="020B0604020202020204" pitchFamily="34" charset="0"/>
               </a:rPr>
               <a:t> ahead of </a:t>
             </a:r>
             <a:r>
-              <a:rPr lang="en-US" noProof="0" dirty="0" err="1">
+              <a:rPr lang="en-US" sz="950" noProof="0" dirty="0" err="1">
                 <a:latin typeface="Arial" panose="020B0604020202020204" pitchFamily="34" charset="0"/>
                 <a:cs typeface="Arial" panose="020B0604020202020204" pitchFamily="34" charset="0"/>
               </a:rPr>
               <a:t>print,August</a:t>
             </a:r>
             <a:r>
-              <a:rPr lang="en-US" noProof="0" dirty="0">
+              <a:rPr lang="en-US" sz="950" noProof="0" dirty="0">
                 <a:latin typeface="Arial" panose="020B0604020202020204" pitchFamily="34" charset="0"/>
                 <a:cs typeface="Arial" panose="020B0604020202020204" pitchFamily="34" charset="0"/>
               </a:rPr>
@@ -16366,70 +16371,70 @@
               <a:buAutoNum type="arabicPeriod"/>
             </a:pPr>
             <a:r>
-              <a:rPr lang="en-US" noProof="0" dirty="0" err="1">
+              <a:rPr lang="en-US" sz="950" noProof="0" dirty="0" err="1">
                 <a:latin typeface="Arial" panose="020B0604020202020204" pitchFamily="34" charset="0"/>
                 <a:cs typeface="Arial" panose="020B0604020202020204" pitchFamily="34" charset="0"/>
               </a:rPr>
               <a:t>Courty</a:t>
             </a:r>
             <a:r>
-              <a:rPr lang="en-US" noProof="0" dirty="0">
+              <a:rPr lang="en-US" sz="950" noProof="0" dirty="0">
                 <a:latin typeface="Arial" panose="020B0604020202020204" pitchFamily="34" charset="0"/>
                 <a:cs typeface="Arial" panose="020B0604020202020204" pitchFamily="34" charset="0"/>
               </a:rPr>
               <a:t>, N., </a:t>
             </a:r>
             <a:r>
-              <a:rPr lang="en-US" noProof="0" dirty="0" err="1">
+              <a:rPr lang="en-US" sz="950" noProof="0" dirty="0" err="1">
                 <a:latin typeface="Arial" panose="020B0604020202020204" pitchFamily="34" charset="0"/>
                 <a:cs typeface="Arial" panose="020B0604020202020204" pitchFamily="34" charset="0"/>
               </a:rPr>
               <a:t>Flamary</a:t>
             </a:r>
             <a:r>
-              <a:rPr lang="en-US" noProof="0" dirty="0">
+              <a:rPr lang="en-US" sz="950" noProof="0" dirty="0">
                 <a:latin typeface="Arial" panose="020B0604020202020204" pitchFamily="34" charset="0"/>
                 <a:cs typeface="Arial" panose="020B0604020202020204" pitchFamily="34" charset="0"/>
               </a:rPr>
               <a:t>, R., </a:t>
             </a:r>
             <a:r>
-              <a:rPr lang="en-US" noProof="0" dirty="0" err="1">
+              <a:rPr lang="en-US" sz="950" noProof="0" dirty="0" err="1">
                 <a:latin typeface="Arial" panose="020B0604020202020204" pitchFamily="34" charset="0"/>
                 <a:cs typeface="Arial" panose="020B0604020202020204" pitchFamily="34" charset="0"/>
               </a:rPr>
               <a:t>Habrard</a:t>
             </a:r>
             <a:r>
-              <a:rPr lang="en-US" noProof="0" dirty="0">
+              <a:rPr lang="en-US" sz="950" noProof="0" dirty="0">
                 <a:latin typeface="Arial" panose="020B0604020202020204" pitchFamily="34" charset="0"/>
                 <a:cs typeface="Arial" panose="020B0604020202020204" pitchFamily="34" charset="0"/>
               </a:rPr>
               <a:t>, A., and </a:t>
             </a:r>
             <a:r>
-              <a:rPr lang="en-US" noProof="0" dirty="0" err="1">
+              <a:rPr lang="en-US" sz="950" noProof="0" dirty="0" err="1">
                 <a:latin typeface="Arial" panose="020B0604020202020204" pitchFamily="34" charset="0"/>
                 <a:cs typeface="Arial" panose="020B0604020202020204" pitchFamily="34" charset="0"/>
               </a:rPr>
               <a:t>Rakotomamonjy,A</a:t>
             </a:r>
             <a:r>
-              <a:rPr lang="en-US" noProof="0" dirty="0">
+              <a:rPr lang="en-US" sz="950" noProof="0" dirty="0">
                 <a:latin typeface="Arial" panose="020B0604020202020204" pitchFamily="34" charset="0"/>
                 <a:cs typeface="Arial" panose="020B0604020202020204" pitchFamily="34" charset="0"/>
               </a:rPr>
               <a:t>. (2017a). Joint distribution optimal transportation for domain adaptation. In Proceedings of the31st International Conference on Neural Information Processing Systems, NIPS’17, page 3733–3742, </a:t>
             </a:r>
             <a:r>
-              <a:rPr lang="en-US" noProof="0" dirty="0" err="1">
+              <a:rPr lang="en-US" sz="950" noProof="0" dirty="0" err="1">
                 <a:latin typeface="Arial" panose="020B0604020202020204" pitchFamily="34" charset="0"/>
                 <a:cs typeface="Arial" panose="020B0604020202020204" pitchFamily="34" charset="0"/>
               </a:rPr>
               <a:t>RedHook</a:t>
             </a:r>
             <a:r>
-              <a:rPr lang="en-US" noProof="0" dirty="0">
+              <a:rPr lang="en-US" sz="950" noProof="0" dirty="0">
                 <a:latin typeface="Arial" panose="020B0604020202020204" pitchFamily="34" charset="0"/>
                 <a:cs typeface="Arial" panose="020B0604020202020204" pitchFamily="34" charset="0"/>
               </a:rPr>
@@ -16442,42 +16447,42 @@
               <a:buAutoNum type="arabicPeriod"/>
             </a:pPr>
             <a:r>
-              <a:rPr lang="en-US" noProof="0" dirty="0" err="1">
+              <a:rPr lang="en-US" sz="950" noProof="0" dirty="0" err="1">
                 <a:latin typeface="Arial" panose="020B0604020202020204" pitchFamily="34" charset="0"/>
                 <a:cs typeface="Arial" panose="020B0604020202020204" pitchFamily="34" charset="0"/>
               </a:rPr>
               <a:t>Courty</a:t>
             </a:r>
             <a:r>
-              <a:rPr lang="en-US" noProof="0" dirty="0">
+              <a:rPr lang="en-US" sz="950" noProof="0" dirty="0">
                 <a:latin typeface="Arial" panose="020B0604020202020204" pitchFamily="34" charset="0"/>
                 <a:cs typeface="Arial" panose="020B0604020202020204" pitchFamily="34" charset="0"/>
               </a:rPr>
               <a:t>, N., </a:t>
             </a:r>
             <a:r>
-              <a:rPr lang="en-US" noProof="0" dirty="0" err="1">
+              <a:rPr lang="en-US" sz="950" noProof="0" dirty="0" err="1">
                 <a:latin typeface="Arial" panose="020B0604020202020204" pitchFamily="34" charset="0"/>
                 <a:cs typeface="Arial" panose="020B0604020202020204" pitchFamily="34" charset="0"/>
               </a:rPr>
               <a:t>Flamary</a:t>
             </a:r>
             <a:r>
-              <a:rPr lang="en-US" noProof="0" dirty="0">
+              <a:rPr lang="en-US" sz="950" noProof="0" dirty="0">
                 <a:latin typeface="Arial" panose="020B0604020202020204" pitchFamily="34" charset="0"/>
                 <a:cs typeface="Arial" panose="020B0604020202020204" pitchFamily="34" charset="0"/>
               </a:rPr>
               <a:t>, R., Tuia, D., and </a:t>
             </a:r>
             <a:r>
-              <a:rPr lang="en-US" noProof="0" dirty="0" err="1">
+              <a:rPr lang="en-US" sz="950" noProof="0" dirty="0" err="1">
                 <a:latin typeface="Arial" panose="020B0604020202020204" pitchFamily="34" charset="0"/>
                 <a:cs typeface="Arial" panose="020B0604020202020204" pitchFamily="34" charset="0"/>
               </a:rPr>
               <a:t>Rakotomamonjy</a:t>
             </a:r>
             <a:r>
-              <a:rPr lang="en-US" noProof="0" dirty="0">
+              <a:rPr lang="en-US" sz="950" noProof="0" dirty="0">
                 <a:latin typeface="Arial" panose="020B0604020202020204" pitchFamily="34" charset="0"/>
                 <a:cs typeface="Arial" panose="020B0604020202020204" pitchFamily="34" charset="0"/>
               </a:rPr>
@@ -16490,105 +16495,105 @@
               <a:buAutoNum type="arabicPeriod"/>
             </a:pPr>
             <a:r>
-              <a:rPr lang="en-US" noProof="0" dirty="0">
+              <a:rPr lang="en-US" sz="950" noProof="0" dirty="0">
                 <a:latin typeface="Arial" panose="020B0604020202020204" pitchFamily="34" charset="0"/>
                 <a:cs typeface="Arial" panose="020B0604020202020204" pitchFamily="34" charset="0"/>
               </a:rPr>
               <a:t>Farahani, A., </a:t>
             </a:r>
             <a:r>
-              <a:rPr lang="en-US" noProof="0" dirty="0" err="1">
+              <a:rPr lang="en-US" sz="950" noProof="0" dirty="0" err="1">
                 <a:latin typeface="Arial" panose="020B0604020202020204" pitchFamily="34" charset="0"/>
                 <a:cs typeface="Arial" panose="020B0604020202020204" pitchFamily="34" charset="0"/>
               </a:rPr>
               <a:t>Voghoei</a:t>
             </a:r>
             <a:r>
-              <a:rPr lang="en-US" noProof="0" dirty="0">
+              <a:rPr lang="en-US" sz="950" noProof="0" dirty="0">
                 <a:latin typeface="Arial" panose="020B0604020202020204" pitchFamily="34" charset="0"/>
                 <a:cs typeface="Arial" panose="020B0604020202020204" pitchFamily="34" charset="0"/>
               </a:rPr>
               <a:t>, S., Rasheed, K., and </a:t>
             </a:r>
             <a:r>
-              <a:rPr lang="en-US" noProof="0" dirty="0" err="1">
+              <a:rPr lang="en-US" sz="950" noProof="0" dirty="0" err="1">
                 <a:latin typeface="Arial" panose="020B0604020202020204" pitchFamily="34" charset="0"/>
                 <a:cs typeface="Arial" panose="020B0604020202020204" pitchFamily="34" charset="0"/>
               </a:rPr>
               <a:t>Arabnia,H</a:t>
             </a:r>
             <a:r>
-              <a:rPr lang="en-US" noProof="0" dirty="0">
+              <a:rPr lang="en-US" sz="950" noProof="0" dirty="0">
                 <a:latin typeface="Arial" panose="020B0604020202020204" pitchFamily="34" charset="0"/>
                 <a:cs typeface="Arial" panose="020B0604020202020204" pitchFamily="34" charset="0"/>
               </a:rPr>
               <a:t>. R. (2021). A brief review of domain adaptation. In </a:t>
             </a:r>
             <a:r>
-              <a:rPr lang="en-US" noProof="0" dirty="0" err="1">
+              <a:rPr lang="en-US" sz="950" noProof="0" dirty="0" err="1">
                 <a:latin typeface="Arial" panose="020B0604020202020204" pitchFamily="34" charset="0"/>
                 <a:cs typeface="Arial" panose="020B0604020202020204" pitchFamily="34" charset="0"/>
               </a:rPr>
               <a:t>Stahlbock</a:t>
             </a:r>
             <a:r>
-              <a:rPr lang="en-US" noProof="0" dirty="0">
+              <a:rPr lang="en-US" sz="950" noProof="0" dirty="0">
                 <a:latin typeface="Arial" panose="020B0604020202020204" pitchFamily="34" charset="0"/>
                 <a:cs typeface="Arial" panose="020B0604020202020204" pitchFamily="34" charset="0"/>
               </a:rPr>
               <a:t>, R., Weiss, G. </a:t>
             </a:r>
             <a:r>
-              <a:rPr lang="en-US" noProof="0" dirty="0" err="1">
+              <a:rPr lang="en-US" sz="950" noProof="0" dirty="0" err="1">
                 <a:latin typeface="Arial" panose="020B0604020202020204" pitchFamily="34" charset="0"/>
                 <a:cs typeface="Arial" panose="020B0604020202020204" pitchFamily="34" charset="0"/>
               </a:rPr>
               <a:t>M.,Abou</a:t>
             </a:r>
             <a:r>
-              <a:rPr lang="en-US" noProof="0" dirty="0">
+              <a:rPr lang="en-US" sz="950" noProof="0" dirty="0">
                 <a:latin typeface="Arial" panose="020B0604020202020204" pitchFamily="34" charset="0"/>
                 <a:cs typeface="Arial" panose="020B0604020202020204" pitchFamily="34" charset="0"/>
               </a:rPr>
               <a:t>-Nasr, M., Yang, C.-Y., </a:t>
             </a:r>
             <a:r>
-              <a:rPr lang="en-US" noProof="0" dirty="0" err="1">
+              <a:rPr lang="en-US" sz="950" noProof="0" dirty="0" err="1">
                 <a:latin typeface="Arial" panose="020B0604020202020204" pitchFamily="34" charset="0"/>
                 <a:cs typeface="Arial" panose="020B0604020202020204" pitchFamily="34" charset="0"/>
               </a:rPr>
               <a:t>Arabnia</a:t>
             </a:r>
             <a:r>
-              <a:rPr lang="en-US" noProof="0" dirty="0">
+              <a:rPr lang="en-US" sz="950" noProof="0" dirty="0">
                 <a:latin typeface="Arial" panose="020B0604020202020204" pitchFamily="34" charset="0"/>
                 <a:cs typeface="Arial" panose="020B0604020202020204" pitchFamily="34" charset="0"/>
               </a:rPr>
               <a:t>, H. R., and </a:t>
             </a:r>
             <a:r>
-              <a:rPr lang="en-US" noProof="0" dirty="0" err="1">
+              <a:rPr lang="en-US" sz="950" noProof="0" dirty="0" err="1">
                 <a:latin typeface="Arial" panose="020B0604020202020204" pitchFamily="34" charset="0"/>
                 <a:cs typeface="Arial" panose="020B0604020202020204" pitchFamily="34" charset="0"/>
               </a:rPr>
               <a:t>Deligiannidis</a:t>
             </a:r>
             <a:r>
-              <a:rPr lang="en-US" noProof="0" dirty="0">
+              <a:rPr lang="en-US" sz="950" noProof="0" dirty="0">
                 <a:latin typeface="Arial" panose="020B0604020202020204" pitchFamily="34" charset="0"/>
                 <a:cs typeface="Arial" panose="020B0604020202020204" pitchFamily="34" charset="0"/>
               </a:rPr>
               <a:t>, L., editors, Advances in Data Science and Information Engineering, pages 877–894, </a:t>
             </a:r>
             <a:r>
-              <a:rPr lang="en-US" noProof="0" dirty="0" err="1">
+              <a:rPr lang="en-US" sz="950" noProof="0" dirty="0" err="1">
                 <a:latin typeface="Arial" panose="020B0604020202020204" pitchFamily="34" charset="0"/>
                 <a:cs typeface="Arial" panose="020B0604020202020204" pitchFamily="34" charset="0"/>
               </a:rPr>
               <a:t>Cham.Springer</a:t>
             </a:r>
             <a:r>
-              <a:rPr lang="en-US" noProof="0" dirty="0">
+              <a:rPr lang="en-US" sz="950" noProof="0" dirty="0">
                 <a:latin typeface="Arial" panose="020B0604020202020204" pitchFamily="34" charset="0"/>
                 <a:cs typeface="Arial" panose="020B0604020202020204" pitchFamily="34" charset="0"/>
               </a:rPr>
@@ -16601,84 +16606,84 @@
               <a:buAutoNum type="arabicPeriod"/>
             </a:pPr>
             <a:r>
-              <a:rPr lang="en-US" noProof="0" dirty="0" err="1">
+              <a:rPr lang="en-US" sz="950" noProof="0" dirty="0" err="1">
                 <a:latin typeface="Arial" panose="020B0604020202020204" pitchFamily="34" charset="0"/>
                 <a:cs typeface="Arial" panose="020B0604020202020204" pitchFamily="34" charset="0"/>
               </a:rPr>
               <a:t>Feydy</a:t>
             </a:r>
             <a:r>
-              <a:rPr lang="en-US" noProof="0" dirty="0">
+              <a:rPr lang="en-US" sz="950" noProof="0" dirty="0">
                 <a:latin typeface="Arial" panose="020B0604020202020204" pitchFamily="34" charset="0"/>
                 <a:cs typeface="Arial" panose="020B0604020202020204" pitchFamily="34" charset="0"/>
               </a:rPr>
               <a:t>, J., </a:t>
             </a:r>
             <a:r>
-              <a:rPr lang="en-US" noProof="0" dirty="0" err="1">
+              <a:rPr lang="en-US" sz="950" noProof="0" dirty="0" err="1">
                 <a:latin typeface="Arial" panose="020B0604020202020204" pitchFamily="34" charset="0"/>
                 <a:cs typeface="Arial" panose="020B0604020202020204" pitchFamily="34" charset="0"/>
               </a:rPr>
               <a:t>Sejourne</a:t>
             </a:r>
             <a:r>
-              <a:rPr lang="en-US" noProof="0" dirty="0">
+              <a:rPr lang="en-US" sz="950" noProof="0" dirty="0">
                 <a:latin typeface="Arial" panose="020B0604020202020204" pitchFamily="34" charset="0"/>
                 <a:cs typeface="Arial" panose="020B0604020202020204" pitchFamily="34" charset="0"/>
               </a:rPr>
               <a:t>, T., </a:t>
             </a:r>
             <a:r>
-              <a:rPr lang="en-US" noProof="0" dirty="0" err="1">
+              <a:rPr lang="en-US" sz="950" noProof="0" dirty="0" err="1">
                 <a:latin typeface="Arial" panose="020B0604020202020204" pitchFamily="34" charset="0"/>
                 <a:cs typeface="Arial" panose="020B0604020202020204" pitchFamily="34" charset="0"/>
               </a:rPr>
               <a:t>Vialard</a:t>
             </a:r>
             <a:r>
-              <a:rPr lang="en-US" noProof="0" dirty="0">
+              <a:rPr lang="en-US" sz="950" noProof="0" dirty="0">
                 <a:latin typeface="Arial" panose="020B0604020202020204" pitchFamily="34" charset="0"/>
                 <a:cs typeface="Arial" panose="020B0604020202020204" pitchFamily="34" charset="0"/>
               </a:rPr>
               <a:t>, F.-X., Amari, S.-</a:t>
             </a:r>
             <a:r>
-              <a:rPr lang="en-US" noProof="0" dirty="0" err="1">
+              <a:rPr lang="en-US" sz="950" noProof="0" dirty="0" err="1">
                 <a:latin typeface="Arial" panose="020B0604020202020204" pitchFamily="34" charset="0"/>
                 <a:cs typeface="Arial" panose="020B0604020202020204" pitchFamily="34" charset="0"/>
               </a:rPr>
               <a:t>i</a:t>
             </a:r>
             <a:r>
-              <a:rPr lang="en-US" noProof="0" dirty="0">
+              <a:rPr lang="en-US" sz="950" noProof="0" dirty="0">
                 <a:latin typeface="Arial" panose="020B0604020202020204" pitchFamily="34" charset="0"/>
                 <a:cs typeface="Arial" panose="020B0604020202020204" pitchFamily="34" charset="0"/>
               </a:rPr>
               <a:t>.,</a:t>
             </a:r>
             <a:r>
-              <a:rPr lang="en-US" noProof="0" dirty="0" err="1">
+              <a:rPr lang="en-US" sz="950" noProof="0" dirty="0" err="1">
                 <a:latin typeface="Arial" panose="020B0604020202020204" pitchFamily="34" charset="0"/>
                 <a:cs typeface="Arial" panose="020B0604020202020204" pitchFamily="34" charset="0"/>
               </a:rPr>
               <a:t>Trouve</a:t>
             </a:r>
             <a:r>
-              <a:rPr lang="en-US" noProof="0" dirty="0">
+              <a:rPr lang="en-US" sz="950" noProof="0" dirty="0">
                 <a:latin typeface="Arial" panose="020B0604020202020204" pitchFamily="34" charset="0"/>
                 <a:cs typeface="Arial" panose="020B0604020202020204" pitchFamily="34" charset="0"/>
               </a:rPr>
               <a:t>, A., and Peyre, G. (2019). Interpolating between optimal transport and mmd using </a:t>
             </a:r>
             <a:r>
-              <a:rPr lang="en-US" noProof="0" dirty="0" err="1">
+              <a:rPr lang="en-US" sz="950" noProof="0" dirty="0" err="1">
                 <a:latin typeface="Arial" panose="020B0604020202020204" pitchFamily="34" charset="0"/>
                 <a:cs typeface="Arial" panose="020B0604020202020204" pitchFamily="34" charset="0"/>
               </a:rPr>
               <a:t>sinkhorn</a:t>
             </a:r>
             <a:r>
-              <a:rPr lang="en-US" noProof="0" dirty="0">
+              <a:rPr lang="en-US" sz="950" noProof="0" dirty="0">
                 <a:latin typeface="Arial" panose="020B0604020202020204" pitchFamily="34" charset="0"/>
                 <a:cs typeface="Arial" panose="020B0604020202020204" pitchFamily="34" charset="0"/>
               </a:rPr>
@@ -16691,35 +16696,35 @@
               <a:buAutoNum type="arabicPeriod"/>
             </a:pPr>
             <a:r>
-              <a:rPr lang="en-US" noProof="0" dirty="0">
+              <a:rPr lang="en-US" sz="950" noProof="0" dirty="0">
                 <a:latin typeface="Arial" panose="020B0604020202020204" pitchFamily="34" charset="0"/>
                 <a:cs typeface="Arial" panose="020B0604020202020204" pitchFamily="34" charset="0"/>
               </a:rPr>
               <a:t>Fuglede, B. and </a:t>
             </a:r>
             <a:r>
-              <a:rPr lang="en-US" noProof="0" dirty="0" err="1">
+              <a:rPr lang="en-US" sz="950" noProof="0" dirty="0" err="1">
                 <a:latin typeface="Arial" panose="020B0604020202020204" pitchFamily="34" charset="0"/>
                 <a:cs typeface="Arial" panose="020B0604020202020204" pitchFamily="34" charset="0"/>
               </a:rPr>
               <a:t>Topsoe</a:t>
             </a:r>
             <a:r>
-              <a:rPr lang="en-US" noProof="0" dirty="0">
+              <a:rPr lang="en-US" sz="950" noProof="0" dirty="0">
                 <a:latin typeface="Arial" panose="020B0604020202020204" pitchFamily="34" charset="0"/>
                 <a:cs typeface="Arial" panose="020B0604020202020204" pitchFamily="34" charset="0"/>
               </a:rPr>
               <a:t>, F. (2004). Jensen-Shannon divergence and </a:t>
             </a:r>
             <a:r>
-              <a:rPr lang="en-US" noProof="0" dirty="0" err="1">
+              <a:rPr lang="en-US" sz="950" noProof="0" dirty="0" err="1">
                 <a:latin typeface="Arial" panose="020B0604020202020204" pitchFamily="34" charset="0"/>
                 <a:cs typeface="Arial" panose="020B0604020202020204" pitchFamily="34" charset="0"/>
               </a:rPr>
               <a:t>hilbert</a:t>
             </a:r>
             <a:r>
-              <a:rPr lang="en-US" noProof="0" dirty="0">
+              <a:rPr lang="en-US" sz="950" noProof="0" dirty="0">
                 <a:latin typeface="Arial" panose="020B0604020202020204" pitchFamily="34" charset="0"/>
                 <a:cs typeface="Arial" panose="020B0604020202020204" pitchFamily="34" charset="0"/>
               </a:rPr>
@@ -16732,35 +16737,35 @@
               <a:buAutoNum type="arabicPeriod"/>
             </a:pPr>
             <a:r>
-              <a:rPr lang="en-US" noProof="0" dirty="0">
+              <a:rPr lang="en-US" sz="950" noProof="0" dirty="0">
                 <a:latin typeface="Arial" panose="020B0604020202020204" pitchFamily="34" charset="0"/>
                 <a:cs typeface="Arial" panose="020B0604020202020204" pitchFamily="34" charset="0"/>
               </a:rPr>
               <a:t>Gabardi, M., </a:t>
             </a:r>
             <a:r>
-              <a:rPr lang="en-US" noProof="0" dirty="0" err="1">
+              <a:rPr lang="en-US" sz="950" noProof="0" dirty="0" err="1">
                 <a:latin typeface="Arial" panose="020B0604020202020204" pitchFamily="34" charset="0"/>
                 <a:cs typeface="Arial" panose="020B0604020202020204" pitchFamily="34" charset="0"/>
               </a:rPr>
               <a:t>Saibene</a:t>
             </a:r>
             <a:r>
-              <a:rPr lang="en-US" noProof="0" dirty="0">
+              <a:rPr lang="en-US" sz="950" noProof="0" dirty="0">
                 <a:latin typeface="Arial" panose="020B0604020202020204" pitchFamily="34" charset="0"/>
                 <a:cs typeface="Arial" panose="020B0604020202020204" pitchFamily="34" charset="0"/>
               </a:rPr>
               <a:t>, A., Gasparini, F., Rizzo, D., and Stella, F. A. (2023). A multi-artifact </a:t>
             </a:r>
             <a:r>
-              <a:rPr lang="en-US" noProof="0" dirty="0" err="1">
+              <a:rPr lang="en-US" sz="950" noProof="0" dirty="0" err="1">
                 <a:latin typeface="Arial" panose="020B0604020202020204" pitchFamily="34" charset="0"/>
                 <a:cs typeface="Arial" panose="020B0604020202020204" pitchFamily="34" charset="0"/>
               </a:rPr>
               <a:t>eeg</a:t>
             </a:r>
             <a:r>
-              <a:rPr lang="en-US" noProof="0" dirty="0">
+              <a:rPr lang="en-US" sz="950" noProof="0" dirty="0">
                 <a:latin typeface="Arial" panose="020B0604020202020204" pitchFamily="34" charset="0"/>
                 <a:cs typeface="Arial" panose="020B0604020202020204" pitchFamily="34" charset="0"/>
               </a:rPr>
@@ -16773,49 +16778,40 @@
               <a:buAutoNum type="arabicPeriod"/>
             </a:pPr>
             <a:r>
-              <a:rPr lang="en-US" noProof="0" dirty="0">
+              <a:rPr lang="en-US" sz="950" noProof="0" dirty="0">
                 <a:latin typeface="Arial" panose="020B0604020202020204" pitchFamily="34" charset="0"/>
                 <a:cs typeface="Arial" panose="020B0604020202020204" pitchFamily="34" charset="0"/>
               </a:rPr>
               <a:t>Geron, A. (2019). Hands-On Machine Learning with Scikit-Learn, </a:t>
             </a:r>
             <a:r>
-              <a:rPr lang="en-US" noProof="0" dirty="0" err="1">
+              <a:rPr lang="en-US" sz="950" noProof="0" dirty="0" err="1">
                 <a:latin typeface="Arial" panose="020B0604020202020204" pitchFamily="34" charset="0"/>
                 <a:cs typeface="Arial" panose="020B0604020202020204" pitchFamily="34" charset="0"/>
               </a:rPr>
               <a:t>Keras</a:t>
             </a:r>
             <a:r>
-              <a:rPr lang="en-US" noProof="0" dirty="0">
+              <a:rPr lang="en-US" sz="950" noProof="0" dirty="0">
                 <a:latin typeface="Arial" panose="020B0604020202020204" pitchFamily="34" charset="0"/>
                 <a:cs typeface="Arial" panose="020B0604020202020204" pitchFamily="34" charset="0"/>
               </a:rPr>
               <a:t>, and TensorFlow: Concepts, Tools, and Techniques to Build Intelligent </a:t>
             </a:r>
             <a:r>
-              <a:rPr lang="en-US" noProof="0" dirty="0" err="1">
+              <a:rPr lang="en-US" sz="950" noProof="0" dirty="0" err="1">
                 <a:latin typeface="Arial" panose="020B0604020202020204" pitchFamily="34" charset="0"/>
                 <a:cs typeface="Arial" panose="020B0604020202020204" pitchFamily="34" charset="0"/>
               </a:rPr>
               <a:t>Systems.O’Reilly</a:t>
             </a:r>
             <a:r>
-              <a:rPr lang="en-US" noProof="0" dirty="0">
+              <a:rPr lang="en-US" sz="950" noProof="0" dirty="0">
                 <a:latin typeface="Arial" panose="020B0604020202020204" pitchFamily="34" charset="0"/>
                 <a:cs typeface="Arial" panose="020B0604020202020204" pitchFamily="34" charset="0"/>
               </a:rPr>
               <a:t> Media, 2nd edition.</a:t>
             </a:r>
-          </a:p>
-          <a:p>
-            <a:pPr marL="0" indent="0">
-              <a:buNone/>
-            </a:pPr>
-            <a:endParaRPr lang="en-US" noProof="0" dirty="0">
-              <a:latin typeface="Times New Roman" panose="02020603050405020304" pitchFamily="18" charset="0"/>
-              <a:cs typeface="Times New Roman" panose="02020603050405020304" pitchFamily="18" charset="0"/>
-            </a:endParaRPr>
           </a:p>
         </p:txBody>
       </p:sp>
@@ -17162,13 +17158,13 @@
         </p:nvSpPr>
         <p:spPr>
           <a:xfrm>
-            <a:off x="838200" y="1531937"/>
-            <a:ext cx="10515600" cy="4351338"/>
+            <a:off x="336000" y="1559047"/>
+            <a:ext cx="11520000" cy="4351338"/>
           </a:xfrm>
         </p:spPr>
         <p:txBody>
           <a:bodyPr>
-            <a:normAutofit fontScale="32500" lnSpcReduction="20000"/>
+            <a:normAutofit/>
           </a:bodyPr>
           <a:lstStyle/>
           <a:p>
@@ -17177,70 +17173,70 @@
               <a:buAutoNum type="arabicPeriod" startAt="17"/>
             </a:pPr>
             <a:r>
-              <a:rPr lang="en-US" dirty="0" err="1">
+              <a:rPr lang="en-US" sz="950" dirty="0" err="1">
                 <a:latin typeface="Arial" panose="020B0604020202020204" pitchFamily="34" charset="0"/>
                 <a:cs typeface="Arial" panose="020B0604020202020204" pitchFamily="34" charset="0"/>
               </a:rPr>
               <a:t>Geuter</a:t>
             </a:r>
             <a:r>
-              <a:rPr lang="en-US" dirty="0">
+              <a:rPr lang="en-US" sz="950" dirty="0">
                 <a:latin typeface="Arial" panose="020B0604020202020204" pitchFamily="34" charset="0"/>
                 <a:cs typeface="Arial" panose="020B0604020202020204" pitchFamily="34" charset="0"/>
               </a:rPr>
               <a:t>, J., </a:t>
             </a:r>
             <a:r>
-              <a:rPr lang="en-US" dirty="0" err="1">
+              <a:rPr lang="en-US" sz="950" dirty="0" err="1">
                 <a:latin typeface="Arial" panose="020B0604020202020204" pitchFamily="34" charset="0"/>
                 <a:cs typeface="Arial" panose="020B0604020202020204" pitchFamily="34" charset="0"/>
               </a:rPr>
               <a:t>Kornhardt</a:t>
             </a:r>
             <a:r>
-              <a:rPr lang="en-US" dirty="0">
+              <a:rPr lang="en-US" sz="950" dirty="0">
                 <a:latin typeface="Arial" panose="020B0604020202020204" pitchFamily="34" charset="0"/>
                 <a:cs typeface="Arial" panose="020B0604020202020204" pitchFamily="34" charset="0"/>
               </a:rPr>
               <a:t>, G., Tomasson, I., and </a:t>
             </a:r>
             <a:r>
-              <a:rPr lang="en-US" dirty="0" err="1">
+              <a:rPr lang="en-US" sz="950" dirty="0" err="1">
                 <a:latin typeface="Arial" panose="020B0604020202020204" pitchFamily="34" charset="0"/>
                 <a:cs typeface="Arial" panose="020B0604020202020204" pitchFamily="34" charset="0"/>
               </a:rPr>
               <a:t>Laschos,V</a:t>
             </a:r>
             <a:r>
-              <a:rPr lang="en-US" dirty="0">
+              <a:rPr lang="en-US" sz="950" dirty="0">
                 <a:latin typeface="Arial" panose="020B0604020202020204" pitchFamily="34" charset="0"/>
                 <a:cs typeface="Arial" panose="020B0604020202020204" pitchFamily="34" charset="0"/>
               </a:rPr>
               <a:t>. (2025). Universal neural optimal transport. In Singh, A., Fazel, M., Hsu, D., Lacoste-Julien, S.,</a:t>
             </a:r>
             <a:r>
-              <a:rPr lang="en-US" dirty="0" err="1">
+              <a:rPr lang="en-US" sz="950" dirty="0" err="1">
                 <a:latin typeface="Arial" panose="020B0604020202020204" pitchFamily="34" charset="0"/>
                 <a:cs typeface="Arial" panose="020B0604020202020204" pitchFamily="34" charset="0"/>
               </a:rPr>
               <a:t>Berkenkamp</a:t>
             </a:r>
             <a:r>
-              <a:rPr lang="en-US" dirty="0">
+              <a:rPr lang="en-US" sz="950" dirty="0">
                 <a:latin typeface="Arial" panose="020B0604020202020204" pitchFamily="34" charset="0"/>
                 <a:cs typeface="Arial" panose="020B0604020202020204" pitchFamily="34" charset="0"/>
               </a:rPr>
               <a:t>, F., Maharaj, T., Wagstaff, K., and </a:t>
             </a:r>
             <a:r>
-              <a:rPr lang="en-US" dirty="0" err="1">
+              <a:rPr lang="en-US" sz="950" dirty="0" err="1">
                 <a:latin typeface="Arial" panose="020B0604020202020204" pitchFamily="34" charset="0"/>
                 <a:cs typeface="Arial" panose="020B0604020202020204" pitchFamily="34" charset="0"/>
               </a:rPr>
               <a:t>Zhu,J</a:t>
             </a:r>
             <a:r>
-              <a:rPr lang="en-US" dirty="0">
+              <a:rPr lang="en-US" sz="950" dirty="0">
                 <a:latin typeface="Arial" panose="020B0604020202020204" pitchFamily="34" charset="0"/>
                 <a:cs typeface="Arial" panose="020B0604020202020204" pitchFamily="34" charset="0"/>
               </a:rPr>
@@ -17253,7 +17249,7 @@
               <a:buAutoNum type="arabicPeriod" startAt="17"/>
             </a:pPr>
             <a:r>
-              <a:rPr lang="en-US" dirty="0">
+              <a:rPr lang="en-US" sz="950" dirty="0">
                 <a:latin typeface="Arial" panose="020B0604020202020204" pitchFamily="34" charset="0"/>
                 <a:cs typeface="Arial" panose="020B0604020202020204" pitchFamily="34" charset="0"/>
               </a:rPr>
@@ -17266,42 +17262,42 @@
               <a:buAutoNum type="arabicPeriod" startAt="17"/>
             </a:pPr>
             <a:r>
-              <a:rPr lang="en-US" dirty="0" err="1">
+              <a:rPr lang="en-US" sz="950" dirty="0" err="1">
                 <a:latin typeface="Arial" panose="020B0604020202020204" pitchFamily="34" charset="0"/>
                 <a:cs typeface="Arial" panose="020B0604020202020204" pitchFamily="34" charset="0"/>
               </a:rPr>
               <a:t>Grandini</a:t>
             </a:r>
             <a:r>
-              <a:rPr lang="en-US" dirty="0">
+              <a:rPr lang="en-US" sz="950" dirty="0">
                 <a:latin typeface="Arial" panose="020B0604020202020204" pitchFamily="34" charset="0"/>
                 <a:cs typeface="Arial" panose="020B0604020202020204" pitchFamily="34" charset="0"/>
               </a:rPr>
               <a:t>, M., Bagli, E., and </a:t>
             </a:r>
             <a:r>
-              <a:rPr lang="en-US" dirty="0" err="1">
+              <a:rPr lang="en-US" sz="950" dirty="0" err="1">
                 <a:latin typeface="Arial" panose="020B0604020202020204" pitchFamily="34" charset="0"/>
                 <a:cs typeface="Arial" panose="020B0604020202020204" pitchFamily="34" charset="0"/>
               </a:rPr>
               <a:t>Visani</a:t>
             </a:r>
             <a:r>
-              <a:rPr lang="en-US" dirty="0">
+              <a:rPr lang="en-US" sz="950" dirty="0">
                 <a:latin typeface="Arial" panose="020B0604020202020204" pitchFamily="34" charset="0"/>
                 <a:cs typeface="Arial" panose="020B0604020202020204" pitchFamily="34" charset="0"/>
               </a:rPr>
               <a:t>, G. (2020). Metrics for multi-class classification: an overview. </a:t>
             </a:r>
             <a:r>
-              <a:rPr lang="en-US" dirty="0" err="1">
+              <a:rPr lang="en-US" sz="950" dirty="0" err="1">
                 <a:latin typeface="Arial" panose="020B0604020202020204" pitchFamily="34" charset="0"/>
                 <a:cs typeface="Arial" panose="020B0604020202020204" pitchFamily="34" charset="0"/>
               </a:rPr>
               <a:t>ArXiv,abs</a:t>
             </a:r>
             <a:r>
-              <a:rPr lang="en-US" dirty="0">
+              <a:rPr lang="en-US" sz="950" dirty="0">
                 <a:latin typeface="Arial" panose="020B0604020202020204" pitchFamily="34" charset="0"/>
                 <a:cs typeface="Arial" panose="020B0604020202020204" pitchFamily="34" charset="0"/>
               </a:rPr>
@@ -17314,49 +17310,49 @@
               <a:buAutoNum type="arabicPeriod" startAt="17"/>
             </a:pPr>
             <a:r>
-              <a:rPr lang="en-US" dirty="0">
+              <a:rPr lang="en-US" sz="950" dirty="0">
                 <a:latin typeface="Arial" panose="020B0604020202020204" pitchFamily="34" charset="0"/>
                 <a:cs typeface="Arial" panose="020B0604020202020204" pitchFamily="34" charset="0"/>
               </a:rPr>
               <a:t>Hamid, A., Gagliano, K., Rahman, S., Tulin, N., </a:t>
             </a:r>
             <a:r>
-              <a:rPr lang="en-US" dirty="0" err="1">
+              <a:rPr lang="en-US" sz="950" dirty="0" err="1">
                 <a:latin typeface="Arial" panose="020B0604020202020204" pitchFamily="34" charset="0"/>
                 <a:cs typeface="Arial" panose="020B0604020202020204" pitchFamily="34" charset="0"/>
               </a:rPr>
               <a:t>Tchiong,V</a:t>
             </a:r>
             <a:r>
-              <a:rPr lang="en-US" dirty="0">
+              <a:rPr lang="en-US" sz="950" dirty="0">
                 <a:latin typeface="Arial" panose="020B0604020202020204" pitchFamily="34" charset="0"/>
                 <a:cs typeface="Arial" panose="020B0604020202020204" pitchFamily="34" charset="0"/>
               </a:rPr>
               <a:t>., Obeid, I., and Picone, J. (2020). The temple university artifact corpus: An annotated corpus of </a:t>
             </a:r>
             <a:r>
-              <a:rPr lang="en-US" dirty="0" err="1">
+              <a:rPr lang="en-US" sz="950" dirty="0" err="1">
                 <a:latin typeface="Arial" panose="020B0604020202020204" pitchFamily="34" charset="0"/>
                 <a:cs typeface="Arial" panose="020B0604020202020204" pitchFamily="34" charset="0"/>
               </a:rPr>
               <a:t>eeg</a:t>
             </a:r>
             <a:r>
-              <a:rPr lang="en-US" dirty="0">
+              <a:rPr lang="en-US" sz="950" dirty="0">
                 <a:latin typeface="Arial" panose="020B0604020202020204" pitchFamily="34" charset="0"/>
                 <a:cs typeface="Arial" panose="020B0604020202020204" pitchFamily="34" charset="0"/>
               </a:rPr>
               <a:t> artifacts. In 2020 IEEE Signal Processing in </a:t>
             </a:r>
             <a:r>
-              <a:rPr lang="en-US" dirty="0" err="1">
+              <a:rPr lang="en-US" sz="950" dirty="0" err="1">
                 <a:latin typeface="Arial" panose="020B0604020202020204" pitchFamily="34" charset="0"/>
                 <a:cs typeface="Arial" panose="020B0604020202020204" pitchFamily="34" charset="0"/>
               </a:rPr>
               <a:t>Medicineand</a:t>
             </a:r>
             <a:r>
-              <a:rPr lang="en-US" dirty="0">
+              <a:rPr lang="en-US" sz="950" dirty="0">
                 <a:latin typeface="Arial" panose="020B0604020202020204" pitchFamily="34" charset="0"/>
                 <a:cs typeface="Arial" panose="020B0604020202020204" pitchFamily="34" charset="0"/>
               </a:rPr>
@@ -17369,35 +17365,35 @@
               <a:buAutoNum type="arabicPeriod" startAt="17"/>
             </a:pPr>
             <a:r>
-              <a:rPr lang="en-US" dirty="0">
+              <a:rPr lang="en-US" sz="950" dirty="0">
                 <a:latin typeface="Arial" panose="020B0604020202020204" pitchFamily="34" charset="0"/>
                 <a:cs typeface="Arial" panose="020B0604020202020204" pitchFamily="34" charset="0"/>
               </a:rPr>
               <a:t>Huang, X., Li, C., Liu, A., Qian, R., and Chen, X.(2024). </a:t>
             </a:r>
             <a:r>
-              <a:rPr lang="en-US" dirty="0" err="1">
+              <a:rPr lang="en-US" sz="950" dirty="0" err="1">
                 <a:latin typeface="Arial" panose="020B0604020202020204" pitchFamily="34" charset="0"/>
                 <a:cs typeface="Arial" panose="020B0604020202020204" pitchFamily="34" charset="0"/>
               </a:rPr>
               <a:t>Eegdfus</a:t>
             </a:r>
             <a:r>
-              <a:rPr lang="en-US" dirty="0">
+              <a:rPr lang="en-US" sz="950" dirty="0">
                 <a:latin typeface="Arial" panose="020B0604020202020204" pitchFamily="34" charset="0"/>
                 <a:cs typeface="Arial" panose="020B0604020202020204" pitchFamily="34" charset="0"/>
               </a:rPr>
               <a:t>: A conditional diffusion model for fine-grained </a:t>
             </a:r>
             <a:r>
-              <a:rPr lang="en-US" dirty="0" err="1">
+              <a:rPr lang="en-US" sz="950" dirty="0" err="1">
                 <a:latin typeface="Arial" panose="020B0604020202020204" pitchFamily="34" charset="0"/>
                 <a:cs typeface="Arial" panose="020B0604020202020204" pitchFamily="34" charset="0"/>
               </a:rPr>
               <a:t>eeg</a:t>
             </a:r>
             <a:r>
-              <a:rPr lang="en-US" dirty="0">
+              <a:rPr lang="en-US" sz="950" dirty="0">
                 <a:latin typeface="Arial" panose="020B0604020202020204" pitchFamily="34" charset="0"/>
                 <a:cs typeface="Arial" panose="020B0604020202020204" pitchFamily="34" charset="0"/>
               </a:rPr>
@@ -17410,49 +17406,49 @@
               <a:buAutoNum type="arabicPeriod" startAt="17"/>
             </a:pPr>
             <a:r>
-              <a:rPr lang="en-US" dirty="0">
+              <a:rPr lang="en-US" sz="950" dirty="0">
                 <a:latin typeface="Arial" panose="020B0604020202020204" pitchFamily="34" charset="0"/>
                 <a:cs typeface="Arial" panose="020B0604020202020204" pitchFamily="34" charset="0"/>
               </a:rPr>
               <a:t>Jackson, A. F. and Bolger, D. J. (2014). The neurophysiological bases of </a:t>
             </a:r>
             <a:r>
-              <a:rPr lang="en-US" dirty="0" err="1">
+              <a:rPr lang="en-US" sz="950" dirty="0" err="1">
                 <a:latin typeface="Arial" panose="020B0604020202020204" pitchFamily="34" charset="0"/>
                 <a:cs typeface="Arial" panose="020B0604020202020204" pitchFamily="34" charset="0"/>
               </a:rPr>
               <a:t>eeg</a:t>
             </a:r>
             <a:r>
-              <a:rPr lang="en-US" dirty="0">
+              <a:rPr lang="en-US" sz="950" dirty="0">
                 <a:latin typeface="Arial" panose="020B0604020202020204" pitchFamily="34" charset="0"/>
                 <a:cs typeface="Arial" panose="020B0604020202020204" pitchFamily="34" charset="0"/>
               </a:rPr>
               <a:t> and </a:t>
             </a:r>
             <a:r>
-              <a:rPr lang="en-US" dirty="0" err="1">
+              <a:rPr lang="en-US" sz="950" dirty="0" err="1">
                 <a:latin typeface="Arial" panose="020B0604020202020204" pitchFamily="34" charset="0"/>
                 <a:cs typeface="Arial" panose="020B0604020202020204" pitchFamily="34" charset="0"/>
               </a:rPr>
               <a:t>eeg</a:t>
             </a:r>
             <a:r>
-              <a:rPr lang="en-US" dirty="0">
+              <a:rPr lang="en-US" sz="950" dirty="0">
                 <a:latin typeface="Arial" panose="020B0604020202020204" pitchFamily="34" charset="0"/>
                 <a:cs typeface="Arial" panose="020B0604020202020204" pitchFamily="34" charset="0"/>
               </a:rPr>
               <a:t> measurement: a review for the rest of us. Psychophysiology, 51(11):1061–1071. </a:t>
             </a:r>
             <a:r>
-              <a:rPr lang="en-US" dirty="0" err="1">
+              <a:rPr lang="en-US" sz="950" dirty="0" err="1">
                 <a:latin typeface="Arial" panose="020B0604020202020204" pitchFamily="34" charset="0"/>
                 <a:cs typeface="Arial" panose="020B0604020202020204" pitchFamily="34" charset="0"/>
               </a:rPr>
               <a:t>Epub</a:t>
             </a:r>
             <a:r>
-              <a:rPr lang="en-US" dirty="0">
+              <a:rPr lang="en-US" sz="950" dirty="0">
                 <a:latin typeface="Arial" panose="020B0604020202020204" pitchFamily="34" charset="0"/>
                 <a:cs typeface="Arial" panose="020B0604020202020204" pitchFamily="34" charset="0"/>
               </a:rPr>
@@ -17465,21 +17461,21 @@
               <a:buAutoNum type="arabicPeriod" startAt="17"/>
             </a:pPr>
             <a:r>
-              <a:rPr lang="en-US" dirty="0">
+              <a:rPr lang="en-US" sz="950" dirty="0">
                 <a:latin typeface="Arial" panose="020B0604020202020204" pitchFamily="34" charset="0"/>
                 <a:cs typeface="Arial" panose="020B0604020202020204" pitchFamily="34" charset="0"/>
               </a:rPr>
               <a:t>Kim, D. and Keene, S. (2019). Fast automatic artifact annotator for </a:t>
             </a:r>
             <a:r>
-              <a:rPr lang="en-US" dirty="0" err="1">
+              <a:rPr lang="en-US" sz="950" dirty="0" err="1">
                 <a:latin typeface="Arial" panose="020B0604020202020204" pitchFamily="34" charset="0"/>
                 <a:cs typeface="Arial" panose="020B0604020202020204" pitchFamily="34" charset="0"/>
               </a:rPr>
               <a:t>eeg</a:t>
             </a:r>
             <a:r>
-              <a:rPr lang="en-US" dirty="0">
+              <a:rPr lang="en-US" sz="950" dirty="0">
                 <a:latin typeface="Arial" panose="020B0604020202020204" pitchFamily="34" charset="0"/>
                 <a:cs typeface="Arial" panose="020B0604020202020204" pitchFamily="34" charset="0"/>
               </a:rPr>
@@ -17492,7 +17488,7 @@
               <a:buAutoNum type="arabicPeriod" startAt="17"/>
             </a:pPr>
             <a:r>
-              <a:rPr lang="en-US" dirty="0">
+              <a:rPr lang="en-US" sz="950" dirty="0">
                 <a:latin typeface="Arial" panose="020B0604020202020204" pitchFamily="34" charset="0"/>
                 <a:cs typeface="Arial" panose="020B0604020202020204" pitchFamily="34" charset="0"/>
               </a:rPr>
@@ -17505,49 +17501,49 @@
               <a:buAutoNum type="arabicPeriod" startAt="17"/>
             </a:pPr>
             <a:r>
-              <a:rPr lang="en-US" dirty="0">
+              <a:rPr lang="en-US" sz="950" dirty="0">
                 <a:latin typeface="Arial" panose="020B0604020202020204" pitchFamily="34" charset="0"/>
                 <a:cs typeface="Arial" panose="020B0604020202020204" pitchFamily="34" charset="0"/>
               </a:rPr>
               <a:t>Maiwald, A., Ackermann, L., </a:t>
             </a:r>
             <a:r>
-              <a:rPr lang="en-US" dirty="0" err="1">
+              <a:rPr lang="en-US" sz="950" dirty="0" err="1">
                 <a:latin typeface="Arial" panose="020B0604020202020204" pitchFamily="34" charset="0"/>
                 <a:cs typeface="Arial" panose="020B0604020202020204" pitchFamily="34" charset="0"/>
               </a:rPr>
               <a:t>Kalcher</a:t>
             </a:r>
             <a:r>
-              <a:rPr lang="en-US" dirty="0">
+              <a:rPr lang="en-US" sz="950" dirty="0">
                 <a:latin typeface="Arial" panose="020B0604020202020204" pitchFamily="34" charset="0"/>
                 <a:cs typeface="Arial" panose="020B0604020202020204" pitchFamily="34" charset="0"/>
               </a:rPr>
               <a:t>, M., and </a:t>
             </a:r>
             <a:r>
-              <a:rPr lang="en-US" dirty="0" err="1">
+              <a:rPr lang="en-US" sz="950" dirty="0" err="1">
                 <a:latin typeface="Arial" panose="020B0604020202020204" pitchFamily="34" charset="0"/>
                 <a:cs typeface="Arial" panose="020B0604020202020204" pitchFamily="34" charset="0"/>
               </a:rPr>
               <a:t>Wu,D</a:t>
             </a:r>
             <a:r>
-              <a:rPr lang="en-US" dirty="0">
+              <a:rPr lang="en-US" sz="950" dirty="0">
                 <a:latin typeface="Arial" panose="020B0604020202020204" pitchFamily="34" charset="0"/>
                 <a:cs typeface="Arial" panose="020B0604020202020204" pitchFamily="34" charset="0"/>
               </a:rPr>
               <a:t>. J. (2023). Image-based data representations of time series: A comparative analysis in </a:t>
             </a:r>
             <a:r>
-              <a:rPr lang="en-US" dirty="0" err="1">
+              <a:rPr lang="en-US" sz="950" dirty="0" err="1">
                 <a:latin typeface="Arial" panose="020B0604020202020204" pitchFamily="34" charset="0"/>
                 <a:cs typeface="Arial" panose="020B0604020202020204" pitchFamily="34" charset="0"/>
               </a:rPr>
               <a:t>eeg</a:t>
             </a:r>
             <a:r>
-              <a:rPr lang="en-US" dirty="0">
+              <a:rPr lang="en-US" sz="950" dirty="0">
                 <a:latin typeface="Arial" panose="020B0604020202020204" pitchFamily="34" charset="0"/>
                 <a:cs typeface="Arial" panose="020B0604020202020204" pitchFamily="34" charset="0"/>
               </a:rPr>
@@ -17560,63 +17556,63 @@
               <a:buAutoNum type="arabicPeriod" startAt="17"/>
             </a:pPr>
             <a:r>
-              <a:rPr lang="en-US" dirty="0">
+              <a:rPr lang="en-US" sz="950" dirty="0">
                 <a:latin typeface="Arial" panose="020B0604020202020204" pitchFamily="34" charset="0"/>
                 <a:cs typeface="Arial" panose="020B0604020202020204" pitchFamily="34" charset="0"/>
               </a:rPr>
               <a:t>Mashhadi, N., </a:t>
             </a:r>
             <a:r>
-              <a:rPr lang="en-US" dirty="0" err="1">
+              <a:rPr lang="en-US" sz="950" dirty="0" err="1">
                 <a:latin typeface="Arial" panose="020B0604020202020204" pitchFamily="34" charset="0"/>
                 <a:cs typeface="Arial" panose="020B0604020202020204" pitchFamily="34" charset="0"/>
               </a:rPr>
               <a:t>Khuzani</a:t>
             </a:r>
             <a:r>
-              <a:rPr lang="en-US" dirty="0">
+              <a:rPr lang="en-US" sz="950" dirty="0">
                 <a:latin typeface="Arial" panose="020B0604020202020204" pitchFamily="34" charset="0"/>
                 <a:cs typeface="Arial" panose="020B0604020202020204" pitchFamily="34" charset="0"/>
               </a:rPr>
               <a:t>, A. Z., Heidari, M., and </a:t>
             </a:r>
             <a:r>
-              <a:rPr lang="en-US" dirty="0" err="1">
+              <a:rPr lang="en-US" sz="950" dirty="0" err="1">
                 <a:latin typeface="Arial" panose="020B0604020202020204" pitchFamily="34" charset="0"/>
                 <a:cs typeface="Arial" panose="020B0604020202020204" pitchFamily="34" charset="0"/>
               </a:rPr>
               <a:t>Khaledyan,D</a:t>
             </a:r>
             <a:r>
-              <a:rPr lang="en-US" dirty="0">
+              <a:rPr lang="en-US" sz="950" dirty="0">
                 <a:latin typeface="Arial" panose="020B0604020202020204" pitchFamily="34" charset="0"/>
                 <a:cs typeface="Arial" panose="020B0604020202020204" pitchFamily="34" charset="0"/>
               </a:rPr>
               <a:t>. (2020). Deep learning denoising for </a:t>
             </a:r>
             <a:r>
-              <a:rPr lang="en-US" dirty="0" err="1">
+              <a:rPr lang="en-US" sz="950" dirty="0" err="1">
                 <a:latin typeface="Arial" panose="020B0604020202020204" pitchFamily="34" charset="0"/>
                 <a:cs typeface="Arial" panose="020B0604020202020204" pitchFamily="34" charset="0"/>
               </a:rPr>
               <a:t>eog</a:t>
             </a:r>
             <a:r>
-              <a:rPr lang="en-US" dirty="0">
+              <a:rPr lang="en-US" sz="950" dirty="0">
                 <a:latin typeface="Arial" panose="020B0604020202020204" pitchFamily="34" charset="0"/>
                 <a:cs typeface="Arial" panose="020B0604020202020204" pitchFamily="34" charset="0"/>
               </a:rPr>
               <a:t> artifacts removal from </a:t>
             </a:r>
             <a:r>
-              <a:rPr lang="en-US" dirty="0" err="1">
+              <a:rPr lang="en-US" sz="950" dirty="0" err="1">
                 <a:latin typeface="Arial" panose="020B0604020202020204" pitchFamily="34" charset="0"/>
                 <a:cs typeface="Arial" panose="020B0604020202020204" pitchFamily="34" charset="0"/>
               </a:rPr>
               <a:t>eeg</a:t>
             </a:r>
             <a:r>
-              <a:rPr lang="en-US" dirty="0">
+              <a:rPr lang="en-US" sz="950" dirty="0">
                 <a:latin typeface="Arial" panose="020B0604020202020204" pitchFamily="34" charset="0"/>
                 <a:cs typeface="Arial" panose="020B0604020202020204" pitchFamily="34" charset="0"/>
               </a:rPr>
@@ -17629,21 +17625,21 @@
               <a:buAutoNum type="arabicPeriod" startAt="17"/>
             </a:pPr>
             <a:r>
-              <a:rPr lang="en-US" dirty="0">
+              <a:rPr lang="en-US" sz="950" dirty="0">
                 <a:latin typeface="Arial" panose="020B0604020202020204" pitchFamily="34" charset="0"/>
                 <a:cs typeface="Arial" panose="020B0604020202020204" pitchFamily="34" charset="0"/>
               </a:rPr>
               <a:t>Pandya, S., Patel, P., Nord, B. D., Walmsley, and </a:t>
             </a:r>
             <a:r>
-              <a:rPr lang="en-US" dirty="0" err="1">
+              <a:rPr lang="en-US" sz="950" dirty="0" err="1">
                 <a:latin typeface="Arial" panose="020B0604020202020204" pitchFamily="34" charset="0"/>
                 <a:cs typeface="Arial" panose="020B0604020202020204" pitchFamily="34" charset="0"/>
               </a:rPr>
               <a:t>Ciprijanovic</a:t>
             </a:r>
             <a:r>
-              <a:rPr lang="en-US" dirty="0">
+              <a:rPr lang="en-US" sz="950" dirty="0">
                 <a:latin typeface="Arial" panose="020B0604020202020204" pitchFamily="34" charset="0"/>
                 <a:cs typeface="Arial" panose="020B0604020202020204" pitchFamily="34" charset="0"/>
               </a:rPr>
@@ -17656,77 +17652,77 @@
               <a:buAutoNum type="arabicPeriod" startAt="17"/>
             </a:pPr>
             <a:r>
-              <a:rPr lang="en-US" dirty="0">
+              <a:rPr lang="en-US" sz="950" dirty="0">
                 <a:latin typeface="Arial" panose="020B0604020202020204" pitchFamily="34" charset="0"/>
                 <a:cs typeface="Arial" panose="020B0604020202020204" pitchFamily="34" charset="0"/>
               </a:rPr>
               <a:t>Peh, W. Y., Yao, Y., and </a:t>
             </a:r>
             <a:r>
-              <a:rPr lang="en-US" dirty="0" err="1">
+              <a:rPr lang="en-US" sz="950" dirty="0" err="1">
                 <a:latin typeface="Arial" panose="020B0604020202020204" pitchFamily="34" charset="0"/>
                 <a:cs typeface="Arial" panose="020B0604020202020204" pitchFamily="34" charset="0"/>
               </a:rPr>
               <a:t>Dauwels</a:t>
             </a:r>
             <a:r>
-              <a:rPr lang="en-US" dirty="0">
+              <a:rPr lang="en-US" sz="950" dirty="0">
                 <a:latin typeface="Arial" panose="020B0604020202020204" pitchFamily="34" charset="0"/>
                 <a:cs typeface="Arial" panose="020B0604020202020204" pitchFamily="34" charset="0"/>
               </a:rPr>
               <a:t>, J. (2022). </a:t>
             </a:r>
             <a:r>
-              <a:rPr lang="en-US" dirty="0" err="1">
+              <a:rPr lang="en-US" sz="950" dirty="0" err="1">
                 <a:latin typeface="Arial" panose="020B0604020202020204" pitchFamily="34" charset="0"/>
                 <a:cs typeface="Arial" panose="020B0604020202020204" pitchFamily="34" charset="0"/>
               </a:rPr>
               <a:t>Transformerconvolutional</a:t>
             </a:r>
             <a:r>
-              <a:rPr lang="en-US" dirty="0">
+              <a:rPr lang="en-US" sz="950" dirty="0">
                 <a:latin typeface="Arial" panose="020B0604020202020204" pitchFamily="34" charset="0"/>
                 <a:cs typeface="Arial" panose="020B0604020202020204" pitchFamily="34" charset="0"/>
               </a:rPr>
               <a:t> neural networks for automated </a:t>
             </a:r>
             <a:r>
-              <a:rPr lang="en-US" dirty="0" err="1">
+              <a:rPr lang="en-US" sz="950" dirty="0" err="1">
                 <a:latin typeface="Arial" panose="020B0604020202020204" pitchFamily="34" charset="0"/>
                 <a:cs typeface="Arial" panose="020B0604020202020204" pitchFamily="34" charset="0"/>
               </a:rPr>
               <a:t>artifactdetection</a:t>
             </a:r>
             <a:r>
-              <a:rPr lang="en-US" dirty="0">
+              <a:rPr lang="en-US" sz="950" dirty="0">
                 <a:latin typeface="Arial" panose="020B0604020202020204" pitchFamily="34" charset="0"/>
                 <a:cs typeface="Arial" panose="020B0604020202020204" pitchFamily="34" charset="0"/>
               </a:rPr>
               <a:t> in scalp </a:t>
             </a:r>
             <a:r>
-              <a:rPr lang="en-US" dirty="0" err="1">
+              <a:rPr lang="en-US" sz="950" dirty="0" err="1">
                 <a:latin typeface="Arial" panose="020B0604020202020204" pitchFamily="34" charset="0"/>
                 <a:cs typeface="Arial" panose="020B0604020202020204" pitchFamily="34" charset="0"/>
               </a:rPr>
               <a:t>eeg</a:t>
             </a:r>
             <a:r>
-              <a:rPr lang="en-US" dirty="0">
+              <a:rPr lang="en-US" sz="950" dirty="0">
                 <a:latin typeface="Arial" panose="020B0604020202020204" pitchFamily="34" charset="0"/>
                 <a:cs typeface="Arial" panose="020B0604020202020204" pitchFamily="34" charset="0"/>
               </a:rPr>
               <a:t>. 2022 44th Annual </a:t>
             </a:r>
             <a:r>
-              <a:rPr lang="en-US" dirty="0" err="1">
+              <a:rPr lang="en-US" sz="950" dirty="0" err="1">
                 <a:latin typeface="Arial" panose="020B0604020202020204" pitchFamily="34" charset="0"/>
                 <a:cs typeface="Arial" panose="020B0604020202020204" pitchFamily="34" charset="0"/>
               </a:rPr>
               <a:t>InternationalConference</a:t>
             </a:r>
             <a:r>
-              <a:rPr lang="en-US" dirty="0">
+              <a:rPr lang="en-US" sz="950" dirty="0">
                 <a:latin typeface="Arial" panose="020B0604020202020204" pitchFamily="34" charset="0"/>
                 <a:cs typeface="Arial" panose="020B0604020202020204" pitchFamily="34" charset="0"/>
               </a:rPr>
@@ -17739,49 +17735,49 @@
               <a:buAutoNum type="arabicPeriod" startAt="17"/>
             </a:pPr>
             <a:r>
-              <a:rPr lang="en-US" dirty="0">
+              <a:rPr lang="en-US" sz="950" dirty="0">
                 <a:latin typeface="Arial" panose="020B0604020202020204" pitchFamily="34" charset="0"/>
                 <a:cs typeface="Arial" panose="020B0604020202020204" pitchFamily="34" charset="0"/>
               </a:rPr>
               <a:t>Quintero-</a:t>
             </a:r>
             <a:r>
-              <a:rPr lang="en-US" dirty="0" err="1">
+              <a:rPr lang="en-US" sz="950" dirty="0" err="1">
                 <a:latin typeface="Arial" panose="020B0604020202020204" pitchFamily="34" charset="0"/>
                 <a:cs typeface="Arial" panose="020B0604020202020204" pitchFamily="34" charset="0"/>
               </a:rPr>
               <a:t>Rinc´on</a:t>
             </a:r>
             <a:r>
-              <a:rPr lang="en-US" dirty="0">
+              <a:rPr lang="en-US" sz="950" dirty="0">
                 <a:latin typeface="Arial" panose="020B0604020202020204" pitchFamily="34" charset="0"/>
                 <a:cs typeface="Arial" panose="020B0604020202020204" pitchFamily="34" charset="0"/>
               </a:rPr>
               <a:t>, A., Giano, C. D., and Batatia, H. (2021).Chapter 11. artefacts detection in </a:t>
             </a:r>
             <a:r>
-              <a:rPr lang="en-US" dirty="0" err="1">
+              <a:rPr lang="en-US" sz="950" dirty="0" err="1">
                 <a:latin typeface="Arial" panose="020B0604020202020204" pitchFamily="34" charset="0"/>
                 <a:cs typeface="Arial" panose="020B0604020202020204" pitchFamily="34" charset="0"/>
               </a:rPr>
               <a:t>eeg</a:t>
             </a:r>
             <a:r>
-              <a:rPr lang="en-US" dirty="0">
+              <a:rPr lang="en-US" sz="950" dirty="0">
                 <a:latin typeface="Arial" panose="020B0604020202020204" pitchFamily="34" charset="0"/>
                 <a:cs typeface="Arial" panose="020B0604020202020204" pitchFamily="34" charset="0"/>
               </a:rPr>
               <a:t> signals. </a:t>
             </a:r>
             <a:r>
-              <a:rPr lang="en-US" dirty="0" err="1">
+              <a:rPr lang="en-US" sz="950" dirty="0" err="1">
                 <a:latin typeface="Arial" panose="020B0604020202020204" pitchFamily="34" charset="0"/>
                 <a:cs typeface="Arial" panose="020B0604020202020204" pitchFamily="34" charset="0"/>
               </a:rPr>
               <a:t>InArtefacts</a:t>
             </a:r>
             <a:r>
-              <a:rPr lang="en-US" dirty="0">
+              <a:rPr lang="en-US" sz="950" dirty="0">
                 <a:latin typeface="Arial" panose="020B0604020202020204" pitchFamily="34" charset="0"/>
                 <a:cs typeface="Arial" panose="020B0604020202020204" pitchFamily="34" charset="0"/>
               </a:rPr>
@@ -17794,77 +17790,77 @@
               <a:buAutoNum type="arabicPeriod" startAt="17"/>
             </a:pPr>
             <a:r>
-              <a:rPr lang="en-US" dirty="0">
+              <a:rPr lang="en-US" sz="950" dirty="0">
                 <a:latin typeface="Arial" panose="020B0604020202020204" pitchFamily="34" charset="0"/>
                 <a:cs typeface="Arial" panose="020B0604020202020204" pitchFamily="34" charset="0"/>
               </a:rPr>
               <a:t>Saba-Sadiya, S., </a:t>
             </a:r>
             <a:r>
-              <a:rPr lang="en-US" dirty="0" err="1">
+              <a:rPr lang="en-US" sz="950" dirty="0" err="1">
                 <a:latin typeface="Arial" panose="020B0604020202020204" pitchFamily="34" charset="0"/>
                 <a:cs typeface="Arial" panose="020B0604020202020204" pitchFamily="34" charset="0"/>
               </a:rPr>
               <a:t>Chantland</a:t>
             </a:r>
             <a:r>
-              <a:rPr lang="en-US" dirty="0">
+              <a:rPr lang="en-US" sz="950" dirty="0">
                 <a:latin typeface="Arial" panose="020B0604020202020204" pitchFamily="34" charset="0"/>
                 <a:cs typeface="Arial" panose="020B0604020202020204" pitchFamily="34" charset="0"/>
               </a:rPr>
               <a:t>, E., </a:t>
             </a:r>
             <a:r>
-              <a:rPr lang="en-US" dirty="0" err="1">
+              <a:rPr lang="en-US" sz="950" dirty="0" err="1">
                 <a:latin typeface="Arial" panose="020B0604020202020204" pitchFamily="34" charset="0"/>
                 <a:cs typeface="Arial" panose="020B0604020202020204" pitchFamily="34" charset="0"/>
               </a:rPr>
               <a:t>Alhanai</a:t>
             </a:r>
             <a:r>
-              <a:rPr lang="en-US" dirty="0">
+              <a:rPr lang="en-US" sz="950" dirty="0">
                 <a:latin typeface="Arial" panose="020B0604020202020204" pitchFamily="34" charset="0"/>
                 <a:cs typeface="Arial" panose="020B0604020202020204" pitchFamily="34" charset="0"/>
               </a:rPr>
               <a:t>, T., Liu, T., </a:t>
             </a:r>
             <a:r>
-              <a:rPr lang="en-US" dirty="0" err="1">
+              <a:rPr lang="en-US" sz="950" dirty="0" err="1">
                 <a:latin typeface="Arial" panose="020B0604020202020204" pitchFamily="34" charset="0"/>
                 <a:cs typeface="Arial" panose="020B0604020202020204" pitchFamily="34" charset="0"/>
               </a:rPr>
               <a:t>andGhassemi</a:t>
             </a:r>
             <a:r>
-              <a:rPr lang="en-US" dirty="0">
+              <a:rPr lang="en-US" sz="950" dirty="0">
                 <a:latin typeface="Arial" panose="020B0604020202020204" pitchFamily="34" charset="0"/>
                 <a:cs typeface="Arial" panose="020B0604020202020204" pitchFamily="34" charset="0"/>
               </a:rPr>
               <a:t>, M. M. (2021). Unsupervised </a:t>
             </a:r>
             <a:r>
-              <a:rPr lang="en-US" dirty="0" err="1">
+              <a:rPr lang="en-US" sz="950" dirty="0" err="1">
                 <a:latin typeface="Arial" panose="020B0604020202020204" pitchFamily="34" charset="0"/>
                 <a:cs typeface="Arial" panose="020B0604020202020204" pitchFamily="34" charset="0"/>
               </a:rPr>
               <a:t>eeg</a:t>
             </a:r>
             <a:r>
-              <a:rPr lang="en-US" dirty="0">
+              <a:rPr lang="en-US" sz="950" dirty="0">
                 <a:latin typeface="Arial" panose="020B0604020202020204" pitchFamily="34" charset="0"/>
                 <a:cs typeface="Arial" panose="020B0604020202020204" pitchFamily="34" charset="0"/>
               </a:rPr>
               <a:t> </a:t>
             </a:r>
             <a:r>
-              <a:rPr lang="en-US" dirty="0" err="1">
+              <a:rPr lang="en-US" sz="950" dirty="0" err="1">
                 <a:latin typeface="Arial" panose="020B0604020202020204" pitchFamily="34" charset="0"/>
                 <a:cs typeface="Arial" panose="020B0604020202020204" pitchFamily="34" charset="0"/>
               </a:rPr>
               <a:t>artifactdetection</a:t>
             </a:r>
             <a:r>
-              <a:rPr lang="en-US" dirty="0">
+              <a:rPr lang="en-US" sz="950" dirty="0">
                 <a:latin typeface="Arial" panose="020B0604020202020204" pitchFamily="34" charset="0"/>
                 <a:cs typeface="Arial" panose="020B0604020202020204" pitchFamily="34" charset="0"/>
               </a:rPr>
@@ -18216,8 +18212,8 @@
         </p:nvSpPr>
         <p:spPr>
           <a:xfrm>
-            <a:off x="838200" y="1531937"/>
-            <a:ext cx="10515600" cy="4351338"/>
+            <a:off x="336000" y="1427162"/>
+            <a:ext cx="11520000" cy="4351338"/>
           </a:xfrm>
         </p:spPr>
         <p:txBody>
@@ -18231,56 +18227,56 @@
               <a:buAutoNum type="arabicPeriod" startAt="31"/>
             </a:pPr>
             <a:r>
-              <a:rPr lang="en-US" sz="900" dirty="0" err="1">
+              <a:rPr lang="en-US" sz="950" dirty="0" err="1">
                 <a:latin typeface="Arial" panose="020B0604020202020204" pitchFamily="34" charset="0"/>
                 <a:cs typeface="Arial" panose="020B0604020202020204" pitchFamily="34" charset="0"/>
               </a:rPr>
               <a:t>Shlens</a:t>
             </a:r>
             <a:r>
-              <a:rPr lang="en-US" sz="900" dirty="0">
+              <a:rPr lang="en-US" sz="950" dirty="0">
                 <a:latin typeface="Arial" panose="020B0604020202020204" pitchFamily="34" charset="0"/>
                 <a:cs typeface="Arial" panose="020B0604020202020204" pitchFamily="34" charset="0"/>
               </a:rPr>
               <a:t>, J. (2014). Notes on </a:t>
             </a:r>
             <a:r>
-              <a:rPr lang="en-US" sz="900" dirty="0" err="1">
+              <a:rPr lang="en-US" sz="950" dirty="0" err="1">
                 <a:latin typeface="Arial" panose="020B0604020202020204" pitchFamily="34" charset="0"/>
                 <a:cs typeface="Arial" panose="020B0604020202020204" pitchFamily="34" charset="0"/>
               </a:rPr>
               <a:t>kullback-leibler</a:t>
             </a:r>
             <a:r>
-              <a:rPr lang="en-US" sz="900" dirty="0">
+              <a:rPr lang="en-US" sz="950" dirty="0">
                 <a:latin typeface="Arial" panose="020B0604020202020204" pitchFamily="34" charset="0"/>
                 <a:cs typeface="Arial" panose="020B0604020202020204" pitchFamily="34" charset="0"/>
               </a:rPr>
               <a:t> divergence </a:t>
             </a:r>
             <a:r>
-              <a:rPr lang="en-US" sz="900" dirty="0" err="1">
+              <a:rPr lang="en-US" sz="950" dirty="0" err="1">
                 <a:latin typeface="Arial" panose="020B0604020202020204" pitchFamily="34" charset="0"/>
                 <a:cs typeface="Arial" panose="020B0604020202020204" pitchFamily="34" charset="0"/>
               </a:rPr>
               <a:t>andlikelihood</a:t>
             </a:r>
             <a:r>
-              <a:rPr lang="en-US" sz="900" dirty="0">
+              <a:rPr lang="en-US" sz="950" dirty="0">
                 <a:latin typeface="Arial" panose="020B0604020202020204" pitchFamily="34" charset="0"/>
                 <a:cs typeface="Arial" panose="020B0604020202020204" pitchFamily="34" charset="0"/>
               </a:rPr>
               <a:t>. </a:t>
             </a:r>
             <a:r>
-              <a:rPr lang="en-US" sz="900" dirty="0" err="1">
+              <a:rPr lang="en-US" sz="950" dirty="0" err="1">
                 <a:latin typeface="Arial" panose="020B0604020202020204" pitchFamily="34" charset="0"/>
                 <a:cs typeface="Arial" panose="020B0604020202020204" pitchFamily="34" charset="0"/>
               </a:rPr>
               <a:t>ArXiv</a:t>
             </a:r>
             <a:r>
-              <a:rPr lang="en-US" sz="900" dirty="0">
+              <a:rPr lang="en-US" sz="950" dirty="0">
                 <a:latin typeface="Arial" panose="020B0604020202020204" pitchFamily="34" charset="0"/>
                 <a:cs typeface="Arial" panose="020B0604020202020204" pitchFamily="34" charset="0"/>
               </a:rPr>
@@ -18293,14 +18289,14 @@
               <a:buAutoNum type="arabicPeriod" startAt="31"/>
             </a:pPr>
             <a:r>
-              <a:rPr lang="en-US" sz="900" dirty="0" err="1">
+              <a:rPr lang="en-US" sz="950" dirty="0" err="1">
                 <a:latin typeface="Arial" panose="020B0604020202020204" pitchFamily="34" charset="0"/>
                 <a:cs typeface="Arial" panose="020B0604020202020204" pitchFamily="34" charset="0"/>
               </a:rPr>
               <a:t>Tohka</a:t>
             </a:r>
             <a:r>
-              <a:rPr lang="en-US" sz="900" dirty="0">
+              <a:rPr lang="en-US" sz="950" dirty="0">
                 <a:latin typeface="Arial" panose="020B0604020202020204" pitchFamily="34" charset="0"/>
                 <a:cs typeface="Arial" panose="020B0604020202020204" pitchFamily="34" charset="0"/>
               </a:rPr>
@@ -18313,35 +18309,35 @@
               <a:buAutoNum type="arabicPeriod" startAt="31"/>
             </a:pPr>
             <a:r>
-              <a:rPr lang="en-US" sz="900" dirty="0">
+              <a:rPr lang="en-US" sz="950" dirty="0">
                 <a:latin typeface="Arial" panose="020B0604020202020204" pitchFamily="34" charset="0"/>
                 <a:cs typeface="Arial" panose="020B0604020202020204" pitchFamily="34" charset="0"/>
               </a:rPr>
               <a:t>Xiong, W., Ma, L., and Li, H. (2024). A general dual-pathway network for </a:t>
             </a:r>
             <a:r>
-              <a:rPr lang="en-US" sz="900" dirty="0" err="1">
+              <a:rPr lang="en-US" sz="950" dirty="0" err="1">
                 <a:latin typeface="Arial" panose="020B0604020202020204" pitchFamily="34" charset="0"/>
                 <a:cs typeface="Arial" panose="020B0604020202020204" pitchFamily="34" charset="0"/>
               </a:rPr>
               <a:t>eeg</a:t>
             </a:r>
             <a:r>
-              <a:rPr lang="en-US" sz="900" dirty="0">
+              <a:rPr lang="en-US" sz="950" dirty="0">
                 <a:latin typeface="Arial" panose="020B0604020202020204" pitchFamily="34" charset="0"/>
                 <a:cs typeface="Arial" panose="020B0604020202020204" pitchFamily="34" charset="0"/>
               </a:rPr>
               <a:t> denoising. Frontiers </a:t>
             </a:r>
             <a:r>
-              <a:rPr lang="en-US" sz="900" dirty="0" err="1">
+              <a:rPr lang="en-US" sz="950" dirty="0" err="1">
                 <a:latin typeface="Arial" panose="020B0604020202020204" pitchFamily="34" charset="0"/>
                 <a:cs typeface="Arial" panose="020B0604020202020204" pitchFamily="34" charset="0"/>
               </a:rPr>
               <a:t>inNeuroscience</a:t>
             </a:r>
             <a:r>
-              <a:rPr lang="en-US" sz="900" dirty="0">
+              <a:rPr lang="en-US" sz="950" dirty="0">
                 <a:latin typeface="Arial" panose="020B0604020202020204" pitchFamily="34" charset="0"/>
                 <a:cs typeface="Arial" panose="020B0604020202020204" pitchFamily="34" charset="0"/>
               </a:rPr>
@@ -18354,77 +18350,77 @@
               <a:buAutoNum type="arabicPeriod" startAt="31"/>
             </a:pPr>
             <a:r>
-              <a:rPr lang="en-US" sz="900" dirty="0">
+              <a:rPr lang="en-US" sz="950" dirty="0">
                 <a:latin typeface="Arial" panose="020B0604020202020204" pitchFamily="34" charset="0"/>
                 <a:cs typeface="Arial" panose="020B0604020202020204" pitchFamily="34" charset="0"/>
               </a:rPr>
               <a:t>Zhang, H., Zhao, M., Wei, C., Mantini, D., Li, Z., and </a:t>
             </a:r>
             <a:r>
-              <a:rPr lang="en-US" sz="900" dirty="0" err="1">
+              <a:rPr lang="en-US" sz="950" dirty="0" err="1">
                 <a:latin typeface="Arial" panose="020B0604020202020204" pitchFamily="34" charset="0"/>
                 <a:cs typeface="Arial" panose="020B0604020202020204" pitchFamily="34" charset="0"/>
               </a:rPr>
               <a:t>Liu,Q</a:t>
             </a:r>
             <a:r>
-              <a:rPr lang="en-US" sz="900" dirty="0">
+              <a:rPr lang="en-US" sz="950" dirty="0">
                 <a:latin typeface="Arial" panose="020B0604020202020204" pitchFamily="34" charset="0"/>
                 <a:cs typeface="Arial" panose="020B0604020202020204" pitchFamily="34" charset="0"/>
               </a:rPr>
               <a:t>. (2021). </a:t>
             </a:r>
             <a:r>
-              <a:rPr lang="en-US" sz="900" dirty="0" err="1">
+              <a:rPr lang="en-US" sz="950" dirty="0" err="1">
                 <a:latin typeface="Arial" panose="020B0604020202020204" pitchFamily="34" charset="0"/>
                 <a:cs typeface="Arial" panose="020B0604020202020204" pitchFamily="34" charset="0"/>
               </a:rPr>
               <a:t>Eegdenoisenet</a:t>
             </a:r>
             <a:r>
-              <a:rPr lang="en-US" sz="900" dirty="0">
+              <a:rPr lang="en-US" sz="950" dirty="0">
                 <a:latin typeface="Arial" panose="020B0604020202020204" pitchFamily="34" charset="0"/>
                 <a:cs typeface="Arial" panose="020B0604020202020204" pitchFamily="34" charset="0"/>
               </a:rPr>
               <a:t>: a benchmark dataset </a:t>
             </a:r>
             <a:r>
-              <a:rPr lang="en-US" sz="900" dirty="0" err="1">
+              <a:rPr lang="en-US" sz="950" dirty="0" err="1">
                 <a:latin typeface="Arial" panose="020B0604020202020204" pitchFamily="34" charset="0"/>
                 <a:cs typeface="Arial" panose="020B0604020202020204" pitchFamily="34" charset="0"/>
               </a:rPr>
               <a:t>fordeep</a:t>
             </a:r>
             <a:r>
-              <a:rPr lang="en-US" sz="900" dirty="0">
+              <a:rPr lang="en-US" sz="950" dirty="0">
                 <a:latin typeface="Arial" panose="020B0604020202020204" pitchFamily="34" charset="0"/>
                 <a:cs typeface="Arial" panose="020B0604020202020204" pitchFamily="34" charset="0"/>
               </a:rPr>
               <a:t> learning solutions of </a:t>
             </a:r>
             <a:r>
-              <a:rPr lang="en-US" sz="900" dirty="0" err="1">
+              <a:rPr lang="en-US" sz="950" dirty="0" err="1">
                 <a:latin typeface="Arial" panose="020B0604020202020204" pitchFamily="34" charset="0"/>
                 <a:cs typeface="Arial" panose="020B0604020202020204" pitchFamily="34" charset="0"/>
               </a:rPr>
               <a:t>eeg</a:t>
             </a:r>
             <a:r>
-              <a:rPr lang="en-US" sz="900" dirty="0">
+              <a:rPr lang="en-US" sz="950" dirty="0">
                 <a:latin typeface="Arial" panose="020B0604020202020204" pitchFamily="34" charset="0"/>
                 <a:cs typeface="Arial" panose="020B0604020202020204" pitchFamily="34" charset="0"/>
               </a:rPr>
               <a:t> denoising. Journal </a:t>
             </a:r>
             <a:r>
-              <a:rPr lang="en-US" sz="900" dirty="0" err="1">
+              <a:rPr lang="en-US" sz="950" dirty="0" err="1">
                 <a:latin typeface="Arial" panose="020B0604020202020204" pitchFamily="34" charset="0"/>
                 <a:cs typeface="Arial" panose="020B0604020202020204" pitchFamily="34" charset="0"/>
               </a:rPr>
               <a:t>ofNeural</a:t>
             </a:r>
             <a:r>
-              <a:rPr lang="en-US" sz="900" dirty="0">
+              <a:rPr lang="en-US" sz="950" dirty="0">
                 <a:latin typeface="Arial" panose="020B0604020202020204" pitchFamily="34" charset="0"/>
                 <a:cs typeface="Arial" panose="020B0604020202020204" pitchFamily="34" charset="0"/>
               </a:rPr>
@@ -18437,63 +18433,63 @@
               <a:buAutoNum type="arabicPeriod" startAt="31"/>
             </a:pPr>
             <a:r>
-              <a:rPr lang="en-US" sz="900" dirty="0">
+              <a:rPr lang="en-US" sz="950" dirty="0">
                 <a:latin typeface="Arial" panose="020B0604020202020204" pitchFamily="34" charset="0"/>
                 <a:cs typeface="Arial" panose="020B0604020202020204" pitchFamily="34" charset="0"/>
               </a:rPr>
               <a:t>Zunino, L., Olivares, F., Ribeiro, H. V., and </a:t>
             </a:r>
             <a:r>
-              <a:rPr lang="en-US" sz="900" dirty="0" err="1">
+              <a:rPr lang="en-US" sz="950" dirty="0" err="1">
                 <a:latin typeface="Arial" panose="020B0604020202020204" pitchFamily="34" charset="0"/>
                 <a:cs typeface="Arial" panose="020B0604020202020204" pitchFamily="34" charset="0"/>
               </a:rPr>
               <a:t>Rosso,O</a:t>
             </a:r>
             <a:r>
-              <a:rPr lang="en-US" sz="900" dirty="0">
+              <a:rPr lang="en-US" sz="950" dirty="0">
                 <a:latin typeface="Arial" panose="020B0604020202020204" pitchFamily="34" charset="0"/>
                 <a:cs typeface="Arial" panose="020B0604020202020204" pitchFamily="34" charset="0"/>
               </a:rPr>
               <a:t>. A. (2022). Permutation </a:t>
             </a:r>
             <a:r>
-              <a:rPr lang="en-US" sz="900" dirty="0" err="1">
+              <a:rPr lang="en-US" sz="950" dirty="0" err="1">
                 <a:latin typeface="Arial" panose="020B0604020202020204" pitchFamily="34" charset="0"/>
                 <a:cs typeface="Arial" panose="020B0604020202020204" pitchFamily="34" charset="0"/>
               </a:rPr>
               <a:t>jensen-shannon</a:t>
             </a:r>
             <a:r>
-              <a:rPr lang="en-US" sz="900" dirty="0">
+              <a:rPr lang="en-US" sz="950" dirty="0">
                 <a:latin typeface="Arial" panose="020B0604020202020204" pitchFamily="34" charset="0"/>
                 <a:cs typeface="Arial" panose="020B0604020202020204" pitchFamily="34" charset="0"/>
               </a:rPr>
               <a:t> </a:t>
             </a:r>
             <a:r>
-              <a:rPr lang="en-US" sz="900" dirty="0" err="1">
+              <a:rPr lang="en-US" sz="950" dirty="0" err="1">
                 <a:latin typeface="Arial" panose="020B0604020202020204" pitchFamily="34" charset="0"/>
                 <a:cs typeface="Arial" panose="020B0604020202020204" pitchFamily="34" charset="0"/>
               </a:rPr>
               <a:t>distance:A</a:t>
             </a:r>
             <a:r>
-              <a:rPr lang="en-US" sz="900" dirty="0">
+              <a:rPr lang="en-US" sz="950" dirty="0">
                 <a:latin typeface="Arial" panose="020B0604020202020204" pitchFamily="34" charset="0"/>
                 <a:cs typeface="Arial" panose="020B0604020202020204" pitchFamily="34" charset="0"/>
               </a:rPr>
               <a:t> versatile and fast symbolic tool for </a:t>
             </a:r>
             <a:r>
-              <a:rPr lang="en-US" sz="900" dirty="0" err="1">
+              <a:rPr lang="en-US" sz="950" dirty="0" err="1">
                 <a:latin typeface="Arial" panose="020B0604020202020204" pitchFamily="34" charset="0"/>
                 <a:cs typeface="Arial" panose="020B0604020202020204" pitchFamily="34" charset="0"/>
               </a:rPr>
               <a:t>complextime</a:t>
             </a:r>
             <a:r>
-              <a:rPr lang="en-US" sz="900" dirty="0">
+              <a:rPr lang="en-US" sz="950" dirty="0">
                 <a:latin typeface="Arial" panose="020B0604020202020204" pitchFamily="34" charset="0"/>
                 <a:cs typeface="Arial" panose="020B0604020202020204" pitchFamily="34" charset="0"/>
               </a:rPr>
@@ -19910,7 +19906,7 @@
                 <a:latin typeface="Arial" panose="020B0604020202020204" pitchFamily="34" charset="0"/>
                 <a:cs typeface="Arial" panose="020B0604020202020204" pitchFamily="34" charset="0"/>
               </a:rPr>
-              <a:t>Clinical</a:t>
+              <a:t>Critical</a:t>
             </a:r>
             <a:r>
               <a:rPr lang="es-MX" sz="1600" b="1" dirty="0">
@@ -19920,7 +19916,7 @@
                 <a:latin typeface="Arial" panose="020B0604020202020204" pitchFamily="34" charset="0"/>
                 <a:cs typeface="Arial" panose="020B0604020202020204" pitchFamily="34" charset="0"/>
               </a:rPr>
-              <a:t> &amp; </a:t>
+              <a:t> </a:t>
             </a:r>
             <a:r>
               <a:rPr lang="es-MX" sz="1600" b="1" dirty="0" err="1">
@@ -19930,7 +19926,7 @@
                 <a:latin typeface="Arial" panose="020B0604020202020204" pitchFamily="34" charset="0"/>
                 <a:cs typeface="Arial" panose="020B0604020202020204" pitchFamily="34" charset="0"/>
               </a:rPr>
-              <a:t>Research</a:t>
+              <a:t>Challenge</a:t>
             </a:r>
             <a:r>
               <a:rPr lang="es-MX" sz="1600" b="1" dirty="0">
@@ -19940,177 +19936,17 @@
                 <a:latin typeface="Arial" panose="020B0604020202020204" pitchFamily="34" charset="0"/>
                 <a:cs typeface="Arial" panose="020B0604020202020204" pitchFamily="34" charset="0"/>
               </a:rPr>
-              <a:t> </a:t>
-            </a:r>
-            <a:r>
-              <a:rPr lang="es-MX" sz="1600" b="1" dirty="0" err="1">
+              <a:t>: </a:t>
+            </a:r>
+            <a:r>
+              <a:rPr lang="en-US" sz="1600" dirty="0">
                 <a:solidFill>
                   <a:srgbClr val="0C3C57"/>
                 </a:solidFill>
                 <a:latin typeface="Arial" panose="020B0604020202020204" pitchFamily="34" charset="0"/>
                 <a:cs typeface="Arial" panose="020B0604020202020204" pitchFamily="34" charset="0"/>
               </a:rPr>
-              <a:t>Utility</a:t>
-            </a:r>
-            <a:r>
-              <a:rPr lang="es-MX" sz="1600" b="1" dirty="0">
-                <a:solidFill>
-                  <a:srgbClr val="0C3C57"/>
-                </a:solidFill>
-                <a:latin typeface="Arial" panose="020B0604020202020204" pitchFamily="34" charset="0"/>
-                <a:cs typeface="Arial" panose="020B0604020202020204" pitchFamily="34" charset="0"/>
-              </a:rPr>
-              <a:t>: </a:t>
-            </a:r>
-            <a:r>
-              <a:rPr lang="es-MX" sz="1600" dirty="0" err="1">
-                <a:solidFill>
-                  <a:srgbClr val="0C3C57"/>
-                </a:solidFill>
-                <a:latin typeface="Arial" panose="020B0604020202020204" pitchFamily="34" charset="0"/>
-                <a:cs typeface="Arial" panose="020B0604020202020204" pitchFamily="34" charset="0"/>
-              </a:rPr>
-              <a:t>Essential</a:t>
-            </a:r>
-            <a:r>
-              <a:rPr lang="es-MX" sz="1600" dirty="0">
-                <a:solidFill>
-                  <a:srgbClr val="0C3C57"/>
-                </a:solidFill>
-                <a:latin typeface="Arial" panose="020B0604020202020204" pitchFamily="34" charset="0"/>
-                <a:cs typeface="Arial" panose="020B0604020202020204" pitchFamily="34" charset="0"/>
-              </a:rPr>
-              <a:t> </a:t>
-            </a:r>
-            <a:r>
-              <a:rPr lang="es-MX" sz="1600" dirty="0" err="1">
-                <a:solidFill>
-                  <a:srgbClr val="0C3C57"/>
-                </a:solidFill>
-                <a:latin typeface="Arial" panose="020B0604020202020204" pitchFamily="34" charset="0"/>
-                <a:cs typeface="Arial" panose="020B0604020202020204" pitchFamily="34" charset="0"/>
-              </a:rPr>
-              <a:t>for</a:t>
-            </a:r>
-            <a:r>
-              <a:rPr lang="es-MX" sz="1600" dirty="0">
-                <a:solidFill>
-                  <a:srgbClr val="0C3C57"/>
-                </a:solidFill>
-                <a:latin typeface="Arial" panose="020B0604020202020204" pitchFamily="34" charset="0"/>
-                <a:cs typeface="Arial" panose="020B0604020202020204" pitchFamily="34" charset="0"/>
-              </a:rPr>
-              <a:t> </a:t>
-            </a:r>
-            <a:r>
-              <a:rPr lang="es-MX" sz="1600" dirty="0" err="1">
-                <a:solidFill>
-                  <a:srgbClr val="0C3C57"/>
-                </a:solidFill>
-                <a:latin typeface="Arial" panose="020B0604020202020204" pitchFamily="34" charset="0"/>
-                <a:cs typeface="Arial" panose="020B0604020202020204" pitchFamily="34" charset="0"/>
-              </a:rPr>
-              <a:t>neurology</a:t>
-            </a:r>
-            <a:r>
-              <a:rPr lang="es-MX" sz="1600" dirty="0">
-                <a:solidFill>
-                  <a:srgbClr val="0C3C57"/>
-                </a:solidFill>
-                <a:latin typeface="Arial" panose="020B0604020202020204" pitchFamily="34" charset="0"/>
-                <a:cs typeface="Arial" panose="020B0604020202020204" pitchFamily="34" charset="0"/>
-              </a:rPr>
-              <a:t> (</a:t>
-            </a:r>
-            <a:r>
-              <a:rPr lang="es-MX" sz="1600" dirty="0" err="1">
-                <a:solidFill>
-                  <a:srgbClr val="0C3C57"/>
-                </a:solidFill>
-                <a:latin typeface="Arial" panose="020B0604020202020204" pitchFamily="34" charset="0"/>
-                <a:cs typeface="Arial" panose="020B0604020202020204" pitchFamily="34" charset="0"/>
-              </a:rPr>
-              <a:t>epilepsy</a:t>
-            </a:r>
-            <a:r>
-              <a:rPr lang="es-MX" sz="1600" dirty="0">
-                <a:solidFill>
-                  <a:srgbClr val="0C3C57"/>
-                </a:solidFill>
-                <a:latin typeface="Arial" panose="020B0604020202020204" pitchFamily="34" charset="0"/>
-                <a:cs typeface="Arial" panose="020B0604020202020204" pitchFamily="34" charset="0"/>
-              </a:rPr>
-              <a:t>), </a:t>
-            </a:r>
-            <a:r>
-              <a:rPr lang="es-MX" sz="1600" dirty="0" err="1">
-                <a:solidFill>
-                  <a:srgbClr val="0C3C57"/>
-                </a:solidFill>
-                <a:latin typeface="Arial" panose="020B0604020202020204" pitchFamily="34" charset="0"/>
-                <a:cs typeface="Arial" panose="020B0604020202020204" pitchFamily="34" charset="0"/>
-              </a:rPr>
-              <a:t>sleep</a:t>
-            </a:r>
-            <a:r>
-              <a:rPr lang="es-MX" sz="1600" dirty="0">
-                <a:solidFill>
-                  <a:srgbClr val="0C3C57"/>
-                </a:solidFill>
-                <a:latin typeface="Arial" panose="020B0604020202020204" pitchFamily="34" charset="0"/>
-                <a:cs typeface="Arial" panose="020B0604020202020204" pitchFamily="34" charset="0"/>
-              </a:rPr>
-              <a:t> medicine, cognitive </a:t>
-            </a:r>
-            <a:r>
-              <a:rPr lang="es-MX" sz="1600" dirty="0" err="1">
-                <a:solidFill>
-                  <a:srgbClr val="0C3C57"/>
-                </a:solidFill>
-                <a:latin typeface="Arial" panose="020B0604020202020204" pitchFamily="34" charset="0"/>
-                <a:cs typeface="Arial" panose="020B0604020202020204" pitchFamily="34" charset="0"/>
-              </a:rPr>
-              <a:t>neuroscience</a:t>
-            </a:r>
-            <a:r>
-              <a:rPr lang="es-MX" sz="1600" dirty="0">
-                <a:solidFill>
-                  <a:srgbClr val="0C3C57"/>
-                </a:solidFill>
-                <a:latin typeface="Arial" panose="020B0604020202020204" pitchFamily="34" charset="0"/>
-                <a:cs typeface="Arial" panose="020B0604020202020204" pitchFamily="34" charset="0"/>
-              </a:rPr>
-              <a:t>, </a:t>
-            </a:r>
-            <a:r>
-              <a:rPr lang="es-MX" sz="1600" dirty="0" err="1">
-                <a:solidFill>
-                  <a:srgbClr val="0C3C57"/>
-                </a:solidFill>
-                <a:latin typeface="Arial" panose="020B0604020202020204" pitchFamily="34" charset="0"/>
-                <a:cs typeface="Arial" panose="020B0604020202020204" pitchFamily="34" charset="0"/>
-              </a:rPr>
-              <a:t>Brain-Computer</a:t>
-            </a:r>
-            <a:r>
-              <a:rPr lang="es-MX" sz="1600" dirty="0">
-                <a:solidFill>
-                  <a:srgbClr val="0C3C57"/>
-                </a:solidFill>
-                <a:latin typeface="Arial" panose="020B0604020202020204" pitchFamily="34" charset="0"/>
-                <a:cs typeface="Arial" panose="020B0604020202020204" pitchFamily="34" charset="0"/>
-              </a:rPr>
-              <a:t> Interfaces (BCI), and ICU </a:t>
-            </a:r>
-            <a:r>
-              <a:rPr lang="es-MX" sz="1600" dirty="0" err="1">
-                <a:solidFill>
-                  <a:srgbClr val="0C3C57"/>
-                </a:solidFill>
-                <a:latin typeface="Arial" panose="020B0604020202020204" pitchFamily="34" charset="0"/>
-                <a:cs typeface="Arial" panose="020B0604020202020204" pitchFamily="34" charset="0"/>
-              </a:rPr>
-              <a:t>monitoring</a:t>
+              <a:t>Diagnostic accuracy heavily relies on clean signals. Artifacts can mimic pathology, making robust identification crucial.</a:t>
             </a:r>
             <a:r>
               <a:rPr lang="es-MX" sz="1600" dirty="0">

</xml_diff>